<commit_message>
Update AprilTag doxygen tutorial and vpDetectorAprilTag class doc
- New images to explain the white border and tag size

- Image to show the supported tag families
</commit_message>
<xml_diff>
--- a/doc/image/tutorial/detection/img-tag-frame.pptx
+++ b/doc/image/tutorial/detection/img-tag-frame.pptx
@@ -6,6 +6,8 @@
   </p:sldMasterIdLst>
   <p:sldIdLst>
     <p:sldId id="256" r:id="rId2"/>
+    <p:sldId id="257" r:id="rId3"/>
+    <p:sldId id="258" r:id="rId4"/>
   </p:sldIdLst>
   <p:sldSz cx="9906000" cy="6858000" type="A4"/>
   <p:notesSz cx="6858000" cy="9144000"/>
@@ -104,6 +106,11 @@
       </a:defRPr>
     </a:lvl9pPr>
   </p:defaultTextStyle>
+  <p:extLst>
+    <p:ext uri="{EFAFB233-063F-42B5-8137-9DF3F51BA10A}">
+      <p15:sldGuideLst xmlns:p15="http://schemas.microsoft.com/office/powerpoint/2012/main"/>
+    </p:ext>
+  </p:extLst>
 </p:presentation>
 </file>
 
@@ -238,7 +245,7 @@
           <a:p>
             <a:fld id="{A4E9012D-6EA8-574C-BB01-7AF471D0F086}" type="datetimeFigureOut">
               <a:rPr lang="fr-FR" smtClean="0"/>
-              <a:t>11/09/2024</a:t>
+              <a:t>31/03/2025</a:t>
             </a:fld>
             <a:endParaRPr lang="fr-FR"/>
           </a:p>
@@ -408,7 +415,7 @@
           <a:p>
             <a:fld id="{A4E9012D-6EA8-574C-BB01-7AF471D0F086}" type="datetimeFigureOut">
               <a:rPr lang="fr-FR" smtClean="0"/>
-              <a:t>11/09/2024</a:t>
+              <a:t>31/03/2025</a:t>
             </a:fld>
             <a:endParaRPr lang="fr-FR"/>
           </a:p>
@@ -588,7 +595,7 @@
           <a:p>
             <a:fld id="{A4E9012D-6EA8-574C-BB01-7AF471D0F086}" type="datetimeFigureOut">
               <a:rPr lang="fr-FR" smtClean="0"/>
-              <a:t>11/09/2024</a:t>
+              <a:t>31/03/2025</a:t>
             </a:fld>
             <a:endParaRPr lang="fr-FR"/>
           </a:p>
@@ -758,7 +765,7 @@
           <a:p>
             <a:fld id="{A4E9012D-6EA8-574C-BB01-7AF471D0F086}" type="datetimeFigureOut">
               <a:rPr lang="fr-FR" smtClean="0"/>
-              <a:t>11/09/2024</a:t>
+              <a:t>31/03/2025</a:t>
             </a:fld>
             <a:endParaRPr lang="fr-FR"/>
           </a:p>
@@ -1002,7 +1009,7 @@
           <a:p>
             <a:fld id="{A4E9012D-6EA8-574C-BB01-7AF471D0F086}" type="datetimeFigureOut">
               <a:rPr lang="fr-FR" smtClean="0"/>
-              <a:t>11/09/2024</a:t>
+              <a:t>31/03/2025</a:t>
             </a:fld>
             <a:endParaRPr lang="fr-FR"/>
           </a:p>
@@ -1234,7 +1241,7 @@
           <a:p>
             <a:fld id="{A4E9012D-6EA8-574C-BB01-7AF471D0F086}" type="datetimeFigureOut">
               <a:rPr lang="fr-FR" smtClean="0"/>
-              <a:t>11/09/2024</a:t>
+              <a:t>31/03/2025</a:t>
             </a:fld>
             <a:endParaRPr lang="fr-FR"/>
           </a:p>
@@ -1601,7 +1608,7 @@
           <a:p>
             <a:fld id="{A4E9012D-6EA8-574C-BB01-7AF471D0F086}" type="datetimeFigureOut">
               <a:rPr lang="fr-FR" smtClean="0"/>
-              <a:t>11/09/2024</a:t>
+              <a:t>31/03/2025</a:t>
             </a:fld>
             <a:endParaRPr lang="fr-FR"/>
           </a:p>
@@ -1719,7 +1726,7 @@
           <a:p>
             <a:fld id="{A4E9012D-6EA8-574C-BB01-7AF471D0F086}" type="datetimeFigureOut">
               <a:rPr lang="fr-FR" smtClean="0"/>
-              <a:t>11/09/2024</a:t>
+              <a:t>31/03/2025</a:t>
             </a:fld>
             <a:endParaRPr lang="fr-FR"/>
           </a:p>
@@ -1814,7 +1821,7 @@
           <a:p>
             <a:fld id="{A4E9012D-6EA8-574C-BB01-7AF471D0F086}" type="datetimeFigureOut">
               <a:rPr lang="fr-FR" smtClean="0"/>
-              <a:t>11/09/2024</a:t>
+              <a:t>31/03/2025</a:t>
             </a:fld>
             <a:endParaRPr lang="fr-FR"/>
           </a:p>
@@ -2091,7 +2098,7 @@
           <a:p>
             <a:fld id="{A4E9012D-6EA8-574C-BB01-7AF471D0F086}" type="datetimeFigureOut">
               <a:rPr lang="fr-FR" smtClean="0"/>
-              <a:t>11/09/2024</a:t>
+              <a:t>31/03/2025</a:t>
             </a:fld>
             <a:endParaRPr lang="fr-FR"/>
           </a:p>
@@ -2348,7 +2355,7 @@
           <a:p>
             <a:fld id="{A4E9012D-6EA8-574C-BB01-7AF471D0F086}" type="datetimeFigureOut">
               <a:rPr lang="fr-FR" smtClean="0"/>
-              <a:t>11/09/2024</a:t>
+              <a:t>31/03/2025</a:t>
             </a:fld>
             <a:endParaRPr lang="fr-FR"/>
           </a:p>
@@ -2561,7 +2568,7 @@
           <a:p>
             <a:fld id="{A4E9012D-6EA8-574C-BB01-7AF471D0F086}" type="datetimeFigureOut">
               <a:rPr lang="fr-FR" smtClean="0"/>
-              <a:t>11/09/2024</a:t>
+              <a:t>31/03/2025</a:t>
             </a:fld>
             <a:endParaRPr lang="fr-FR"/>
           </a:p>
@@ -2995,7 +3002,9 @@
             <a:avLst/>
           </a:prstGeom>
           <a:ln>
-            <a:noFill/>
+            <a:solidFill>
+              <a:schemeClr val="accent1"/>
+            </a:solidFill>
           </a:ln>
         </p:spPr>
       </p:pic>
@@ -3349,7 +3358,9 @@
             <a:avLst/>
           </a:prstGeom>
           <a:ln>
-            <a:noFill/>
+            <a:solidFill>
+              <a:schemeClr val="accent1"/>
+            </a:solidFill>
           </a:ln>
         </p:spPr>
       </p:pic>
@@ -4345,6 +4356,1134 @@
     <p:extLst>
       <p:ext uri="{BB962C8B-B14F-4D97-AF65-F5344CB8AC3E}">
         <p14:creationId xmlns:p14="http://schemas.microsoft.com/office/powerpoint/2010/main" val="2318027081"/>
+      </p:ext>
+    </p:extLst>
+  </p:cSld>
+  <p:clrMapOvr>
+    <a:masterClrMapping/>
+  </p:clrMapOvr>
+</p:sld>
+</file>
+
+<file path=ppt/slides/slide2.xml><?xml version="1.0" encoding="utf-8"?>
+<p:sld xmlns:a="http://schemas.openxmlformats.org/drawingml/2006/main" xmlns:r="http://schemas.openxmlformats.org/officeDocument/2006/relationships" xmlns:p="http://schemas.openxmlformats.org/presentationml/2006/main">
+  <p:cSld>
+    <p:spTree>
+      <p:nvGrpSpPr>
+        <p:cNvPr id="1" name=""/>
+        <p:cNvGrpSpPr/>
+        <p:nvPr/>
+      </p:nvGrpSpPr>
+      <p:grpSpPr>
+        <a:xfrm>
+          <a:off x="0" y="0"/>
+          <a:ext cx="0" cy="0"/>
+          <a:chOff x="0" y="0"/>
+          <a:chExt cx="0" cy="0"/>
+        </a:xfrm>
+      </p:grpSpPr>
+      <p:pic>
+        <p:nvPicPr>
+          <p:cNvPr id="5" name="Image 4">
+            <a:extLst>
+              <a:ext uri="{FF2B5EF4-FFF2-40B4-BE49-F238E27FC236}">
+                <a16:creationId xmlns:a16="http://schemas.microsoft.com/office/drawing/2014/main" id="{32C45B6A-E963-CE90-DB94-438B75167000}"/>
+              </a:ext>
+            </a:extLst>
+          </p:cNvPr>
+          <p:cNvPicPr>
+            <a:picLocks noChangeAspect="1"/>
+          </p:cNvPicPr>
+          <p:nvPr/>
+        </p:nvPicPr>
+        <p:blipFill>
+          <a:blip r:embed="rId2"/>
+          <a:stretch>
+            <a:fillRect/>
+          </a:stretch>
+        </p:blipFill>
+        <p:spPr>
+          <a:xfrm>
+            <a:off x="720000" y="720000"/>
+            <a:ext cx="1436190" cy="1440000"/>
+          </a:xfrm>
+          <a:prstGeom prst="rect">
+            <a:avLst/>
+          </a:prstGeom>
+        </p:spPr>
+      </p:pic>
+      <p:sp>
+        <p:nvSpPr>
+          <p:cNvPr id="6" name="ZoneTexte 5">
+            <a:extLst>
+              <a:ext uri="{FF2B5EF4-FFF2-40B4-BE49-F238E27FC236}">
+                <a16:creationId xmlns:a16="http://schemas.microsoft.com/office/drawing/2014/main" id="{CA4E19CC-EBC2-B5CE-27D5-228017BF580D}"/>
+              </a:ext>
+            </a:extLst>
+          </p:cNvPr>
+          <p:cNvSpPr txBox="1"/>
+          <p:nvPr/>
+        </p:nvSpPr>
+        <p:spPr>
+          <a:xfrm>
+            <a:off x="720000" y="2311370"/>
+            <a:ext cx="1396265" cy="369332"/>
+          </a:xfrm>
+          <a:prstGeom prst="rect">
+            <a:avLst/>
+          </a:prstGeom>
+          <a:noFill/>
+        </p:spPr>
+        <p:txBody>
+          <a:bodyPr wrap="square" rtlCol="0">
+            <a:spAutoFit/>
+          </a:bodyPr>
+          <a:lstStyle/>
+          <a:p>
+            <a:pPr algn="ctr"/>
+            <a:r>
+              <a:rPr lang="fr-FR" dirty="0"/>
+              <a:t>16h5 id 0</a:t>
+            </a:r>
+          </a:p>
+        </p:txBody>
+      </p:sp>
+      <p:pic>
+        <p:nvPicPr>
+          <p:cNvPr id="8" name="Image 7">
+            <a:extLst>
+              <a:ext uri="{FF2B5EF4-FFF2-40B4-BE49-F238E27FC236}">
+                <a16:creationId xmlns:a16="http://schemas.microsoft.com/office/drawing/2014/main" id="{28209397-B52B-214D-5E1B-2E06397961FE}"/>
+              </a:ext>
+            </a:extLst>
+          </p:cNvPr>
+          <p:cNvPicPr>
+            <a:picLocks noChangeAspect="1"/>
+          </p:cNvPicPr>
+          <p:nvPr/>
+        </p:nvPicPr>
+        <p:blipFill>
+          <a:blip r:embed="rId3"/>
+          <a:stretch>
+            <a:fillRect/>
+          </a:stretch>
+        </p:blipFill>
+        <p:spPr>
+          <a:xfrm>
+            <a:off x="2880000" y="720000"/>
+            <a:ext cx="1436190" cy="1440000"/>
+          </a:xfrm>
+          <a:prstGeom prst="rect">
+            <a:avLst/>
+          </a:prstGeom>
+        </p:spPr>
+      </p:pic>
+      <p:sp>
+        <p:nvSpPr>
+          <p:cNvPr id="9" name="ZoneTexte 8">
+            <a:extLst>
+              <a:ext uri="{FF2B5EF4-FFF2-40B4-BE49-F238E27FC236}">
+                <a16:creationId xmlns:a16="http://schemas.microsoft.com/office/drawing/2014/main" id="{6F13414F-10E0-E5ED-8F26-5D0B59B16ADA}"/>
+              </a:ext>
+            </a:extLst>
+          </p:cNvPr>
+          <p:cNvSpPr txBox="1"/>
+          <p:nvPr/>
+        </p:nvSpPr>
+        <p:spPr>
+          <a:xfrm>
+            <a:off x="2880000" y="2311370"/>
+            <a:ext cx="1436190" cy="369332"/>
+          </a:xfrm>
+          <a:prstGeom prst="rect">
+            <a:avLst/>
+          </a:prstGeom>
+          <a:noFill/>
+        </p:spPr>
+        <p:txBody>
+          <a:bodyPr wrap="square" rtlCol="0">
+            <a:spAutoFit/>
+          </a:bodyPr>
+          <a:lstStyle/>
+          <a:p>
+            <a:pPr algn="ctr"/>
+            <a:r>
+              <a:rPr lang="fr-FR" dirty="0"/>
+              <a:t>25h9 id 0</a:t>
+            </a:r>
+          </a:p>
+        </p:txBody>
+      </p:sp>
+      <p:pic>
+        <p:nvPicPr>
+          <p:cNvPr id="11" name="Image 10">
+            <a:extLst>
+              <a:ext uri="{FF2B5EF4-FFF2-40B4-BE49-F238E27FC236}">
+                <a16:creationId xmlns:a16="http://schemas.microsoft.com/office/drawing/2014/main" id="{4F657AB9-52CA-F2B0-55C7-A27376B0D90B}"/>
+              </a:ext>
+            </a:extLst>
+          </p:cNvPr>
+          <p:cNvPicPr>
+            <a:picLocks noChangeAspect="1"/>
+          </p:cNvPicPr>
+          <p:nvPr/>
+        </p:nvPicPr>
+        <p:blipFill>
+          <a:blip r:embed="rId4"/>
+          <a:stretch>
+            <a:fillRect/>
+          </a:stretch>
+        </p:blipFill>
+        <p:spPr>
+          <a:xfrm>
+            <a:off x="5040000" y="720000"/>
+            <a:ext cx="1436191" cy="1440000"/>
+          </a:xfrm>
+          <a:prstGeom prst="rect">
+            <a:avLst/>
+          </a:prstGeom>
+        </p:spPr>
+      </p:pic>
+      <p:sp>
+        <p:nvSpPr>
+          <p:cNvPr id="12" name="ZoneTexte 11">
+            <a:extLst>
+              <a:ext uri="{FF2B5EF4-FFF2-40B4-BE49-F238E27FC236}">
+                <a16:creationId xmlns:a16="http://schemas.microsoft.com/office/drawing/2014/main" id="{341599F7-1A45-673B-419B-692DF2C1548B}"/>
+              </a:ext>
+            </a:extLst>
+          </p:cNvPr>
+          <p:cNvSpPr txBox="1"/>
+          <p:nvPr/>
+        </p:nvSpPr>
+        <p:spPr>
+          <a:xfrm>
+            <a:off x="5040000" y="2311370"/>
+            <a:ext cx="1436190" cy="369332"/>
+          </a:xfrm>
+          <a:prstGeom prst="rect">
+            <a:avLst/>
+          </a:prstGeom>
+          <a:noFill/>
+        </p:spPr>
+        <p:txBody>
+          <a:bodyPr wrap="square" rtlCol="0">
+            <a:spAutoFit/>
+          </a:bodyPr>
+          <a:lstStyle/>
+          <a:p>
+            <a:pPr algn="ctr"/>
+            <a:r>
+              <a:rPr lang="fr-FR" dirty="0"/>
+              <a:t>36h10 id 0</a:t>
+            </a:r>
+          </a:p>
+        </p:txBody>
+      </p:sp>
+      <p:pic>
+        <p:nvPicPr>
+          <p:cNvPr id="14" name="Image 13">
+            <a:extLst>
+              <a:ext uri="{FF2B5EF4-FFF2-40B4-BE49-F238E27FC236}">
+                <a16:creationId xmlns:a16="http://schemas.microsoft.com/office/drawing/2014/main" id="{A7B4603B-0B0C-DE54-5F28-CF3626A7A03F}"/>
+              </a:ext>
+            </a:extLst>
+          </p:cNvPr>
+          <p:cNvPicPr>
+            <a:picLocks noChangeAspect="1"/>
+          </p:cNvPicPr>
+          <p:nvPr/>
+        </p:nvPicPr>
+        <p:blipFill>
+          <a:blip r:embed="rId5"/>
+          <a:stretch>
+            <a:fillRect/>
+          </a:stretch>
+        </p:blipFill>
+        <p:spPr>
+          <a:xfrm>
+            <a:off x="7200000" y="720000"/>
+            <a:ext cx="1436191" cy="1440000"/>
+          </a:xfrm>
+          <a:prstGeom prst="rect">
+            <a:avLst/>
+          </a:prstGeom>
+        </p:spPr>
+      </p:pic>
+      <p:sp>
+        <p:nvSpPr>
+          <p:cNvPr id="15" name="ZoneTexte 14">
+            <a:extLst>
+              <a:ext uri="{FF2B5EF4-FFF2-40B4-BE49-F238E27FC236}">
+                <a16:creationId xmlns:a16="http://schemas.microsoft.com/office/drawing/2014/main" id="{7092D9E7-A16F-DA78-8282-27B7A1BAA128}"/>
+              </a:ext>
+            </a:extLst>
+          </p:cNvPr>
+          <p:cNvSpPr txBox="1"/>
+          <p:nvPr/>
+        </p:nvSpPr>
+        <p:spPr>
+          <a:xfrm>
+            <a:off x="7199999" y="2311370"/>
+            <a:ext cx="1436189" cy="369332"/>
+          </a:xfrm>
+          <a:prstGeom prst="rect">
+            <a:avLst/>
+          </a:prstGeom>
+          <a:noFill/>
+        </p:spPr>
+        <p:txBody>
+          <a:bodyPr wrap="square" rtlCol="0">
+            <a:spAutoFit/>
+          </a:bodyPr>
+          <a:lstStyle/>
+          <a:p>
+            <a:pPr algn="ctr"/>
+            <a:r>
+              <a:rPr lang="fr-FR" dirty="0"/>
+              <a:t>36h11 id 0</a:t>
+            </a:r>
+          </a:p>
+        </p:txBody>
+      </p:sp>
+      <p:pic>
+        <p:nvPicPr>
+          <p:cNvPr id="17" name="Image 16">
+            <a:extLst>
+              <a:ext uri="{FF2B5EF4-FFF2-40B4-BE49-F238E27FC236}">
+                <a16:creationId xmlns:a16="http://schemas.microsoft.com/office/drawing/2014/main" id="{079B5830-B0EB-0F7A-F17D-1777AD6F3D4F}"/>
+              </a:ext>
+            </a:extLst>
+          </p:cNvPr>
+          <p:cNvPicPr>
+            <a:picLocks noChangeAspect="1"/>
+          </p:cNvPicPr>
+          <p:nvPr/>
+        </p:nvPicPr>
+        <p:blipFill>
+          <a:blip r:embed="rId6"/>
+          <a:stretch>
+            <a:fillRect/>
+          </a:stretch>
+        </p:blipFill>
+        <p:spPr>
+          <a:xfrm>
+            <a:off x="720000" y="3090157"/>
+            <a:ext cx="1436191" cy="1440000"/>
+          </a:xfrm>
+          <a:prstGeom prst="rect">
+            <a:avLst/>
+          </a:prstGeom>
+        </p:spPr>
+      </p:pic>
+      <p:sp>
+        <p:nvSpPr>
+          <p:cNvPr id="18" name="ZoneTexte 17">
+            <a:extLst>
+              <a:ext uri="{FF2B5EF4-FFF2-40B4-BE49-F238E27FC236}">
+                <a16:creationId xmlns:a16="http://schemas.microsoft.com/office/drawing/2014/main" id="{83308DFE-E83A-AAB7-1033-71C4A5697BAF}"/>
+              </a:ext>
+            </a:extLst>
+          </p:cNvPr>
+          <p:cNvSpPr txBox="1"/>
+          <p:nvPr/>
+        </p:nvSpPr>
+        <p:spPr>
+          <a:xfrm>
+            <a:off x="591893" y="4706820"/>
+            <a:ext cx="1652478" cy="369332"/>
+          </a:xfrm>
+          <a:prstGeom prst="rect">
+            <a:avLst/>
+          </a:prstGeom>
+          <a:noFill/>
+        </p:spPr>
+        <p:txBody>
+          <a:bodyPr wrap="square" rtlCol="0">
+            <a:spAutoFit/>
+          </a:bodyPr>
+          <a:lstStyle/>
+          <a:p>
+            <a:pPr algn="ctr"/>
+            <a:r>
+              <a:rPr lang="fr-FR" dirty="0" err="1"/>
+              <a:t>ArUco</a:t>
+            </a:r>
+            <a:r>
+              <a:rPr lang="fr-FR" dirty="0"/>
+              <a:t> 4x4 id 0</a:t>
+            </a:r>
+          </a:p>
+        </p:txBody>
+      </p:sp>
+      <p:pic>
+        <p:nvPicPr>
+          <p:cNvPr id="20" name="Image 19">
+            <a:extLst>
+              <a:ext uri="{FF2B5EF4-FFF2-40B4-BE49-F238E27FC236}">
+                <a16:creationId xmlns:a16="http://schemas.microsoft.com/office/drawing/2014/main" id="{3E9AE577-480C-0184-373E-EBF9D1A997F2}"/>
+              </a:ext>
+            </a:extLst>
+          </p:cNvPr>
+          <p:cNvPicPr>
+            <a:picLocks noChangeAspect="1"/>
+          </p:cNvPicPr>
+          <p:nvPr/>
+        </p:nvPicPr>
+        <p:blipFill>
+          <a:blip r:embed="rId7"/>
+          <a:stretch>
+            <a:fillRect/>
+          </a:stretch>
+        </p:blipFill>
+        <p:spPr>
+          <a:xfrm>
+            <a:off x="2880000" y="3149481"/>
+            <a:ext cx="1436191" cy="1440000"/>
+          </a:xfrm>
+          <a:prstGeom prst="rect">
+            <a:avLst/>
+          </a:prstGeom>
+        </p:spPr>
+      </p:pic>
+      <p:sp>
+        <p:nvSpPr>
+          <p:cNvPr id="21" name="ZoneTexte 20">
+            <a:extLst>
+              <a:ext uri="{FF2B5EF4-FFF2-40B4-BE49-F238E27FC236}">
+                <a16:creationId xmlns:a16="http://schemas.microsoft.com/office/drawing/2014/main" id="{C549AB15-22CF-5DB4-EF76-D8F46A57C515}"/>
+              </a:ext>
+            </a:extLst>
+          </p:cNvPr>
+          <p:cNvSpPr txBox="1"/>
+          <p:nvPr/>
+        </p:nvSpPr>
+        <p:spPr>
+          <a:xfrm>
+            <a:off x="2769282" y="4706820"/>
+            <a:ext cx="1599047" cy="369332"/>
+          </a:xfrm>
+          <a:prstGeom prst="rect">
+            <a:avLst/>
+          </a:prstGeom>
+          <a:noFill/>
+        </p:spPr>
+        <p:txBody>
+          <a:bodyPr wrap="square" rtlCol="0">
+            <a:spAutoFit/>
+          </a:bodyPr>
+          <a:lstStyle/>
+          <a:p>
+            <a:pPr algn="ctr"/>
+            <a:r>
+              <a:rPr lang="fr-FR" dirty="0" err="1"/>
+              <a:t>ArUco</a:t>
+            </a:r>
+            <a:r>
+              <a:rPr lang="fr-FR" dirty="0"/>
+              <a:t> 5x5 id 0</a:t>
+            </a:r>
+          </a:p>
+        </p:txBody>
+      </p:sp>
+      <p:pic>
+        <p:nvPicPr>
+          <p:cNvPr id="23" name="Image 22">
+            <a:extLst>
+              <a:ext uri="{FF2B5EF4-FFF2-40B4-BE49-F238E27FC236}">
+                <a16:creationId xmlns:a16="http://schemas.microsoft.com/office/drawing/2014/main" id="{1E99F94D-B36D-97FC-F0A2-F697A0A5837B}"/>
+              </a:ext>
+            </a:extLst>
+          </p:cNvPr>
+          <p:cNvPicPr>
+            <a:picLocks noChangeAspect="1"/>
+          </p:cNvPicPr>
+          <p:nvPr/>
+        </p:nvPicPr>
+        <p:blipFill>
+          <a:blip r:embed="rId8"/>
+          <a:stretch>
+            <a:fillRect/>
+          </a:stretch>
+        </p:blipFill>
+        <p:spPr>
+          <a:xfrm>
+            <a:off x="5040000" y="3090157"/>
+            <a:ext cx="1472095" cy="1476000"/>
+          </a:xfrm>
+          <a:prstGeom prst="rect">
+            <a:avLst/>
+          </a:prstGeom>
+        </p:spPr>
+      </p:pic>
+      <p:sp>
+        <p:nvSpPr>
+          <p:cNvPr id="24" name="ZoneTexte 23">
+            <a:extLst>
+              <a:ext uri="{FF2B5EF4-FFF2-40B4-BE49-F238E27FC236}">
+                <a16:creationId xmlns:a16="http://schemas.microsoft.com/office/drawing/2014/main" id="{8BB17CF4-0CDD-1F77-17C1-D8BC80BDDAF9}"/>
+              </a:ext>
+            </a:extLst>
+          </p:cNvPr>
+          <p:cNvSpPr txBox="1"/>
+          <p:nvPr/>
+        </p:nvSpPr>
+        <p:spPr>
+          <a:xfrm>
+            <a:off x="4953000" y="4706820"/>
+            <a:ext cx="1599047" cy="369332"/>
+          </a:xfrm>
+          <a:prstGeom prst="rect">
+            <a:avLst/>
+          </a:prstGeom>
+          <a:noFill/>
+        </p:spPr>
+        <p:txBody>
+          <a:bodyPr wrap="square" rtlCol="0">
+            <a:spAutoFit/>
+          </a:bodyPr>
+          <a:lstStyle/>
+          <a:p>
+            <a:pPr algn="ctr"/>
+            <a:r>
+              <a:rPr lang="fr-FR" dirty="0" err="1"/>
+              <a:t>ArUco</a:t>
+            </a:r>
+            <a:r>
+              <a:rPr lang="fr-FR" dirty="0"/>
+              <a:t> 6x6 id 0</a:t>
+            </a:r>
+          </a:p>
+        </p:txBody>
+      </p:sp>
+      <p:pic>
+        <p:nvPicPr>
+          <p:cNvPr id="26" name="Image 25">
+            <a:extLst>
+              <a:ext uri="{FF2B5EF4-FFF2-40B4-BE49-F238E27FC236}">
+                <a16:creationId xmlns:a16="http://schemas.microsoft.com/office/drawing/2014/main" id="{B5C3920C-4C4F-B3A4-C597-7BC6F4801D20}"/>
+              </a:ext>
+            </a:extLst>
+          </p:cNvPr>
+          <p:cNvPicPr>
+            <a:picLocks noChangeAspect="1"/>
+          </p:cNvPicPr>
+          <p:nvPr/>
+        </p:nvPicPr>
+        <p:blipFill>
+          <a:blip r:embed="rId9"/>
+          <a:stretch>
+            <a:fillRect/>
+          </a:stretch>
+        </p:blipFill>
+        <p:spPr>
+          <a:xfrm>
+            <a:off x="7200000" y="3090158"/>
+            <a:ext cx="1472095" cy="1476000"/>
+          </a:xfrm>
+          <a:prstGeom prst="rect">
+            <a:avLst/>
+          </a:prstGeom>
+        </p:spPr>
+      </p:pic>
+      <p:sp>
+        <p:nvSpPr>
+          <p:cNvPr id="27" name="ZoneTexte 26">
+            <a:extLst>
+              <a:ext uri="{FF2B5EF4-FFF2-40B4-BE49-F238E27FC236}">
+                <a16:creationId xmlns:a16="http://schemas.microsoft.com/office/drawing/2014/main" id="{156CA3DD-82A5-5DF7-3215-7B12C520AA9C}"/>
+              </a:ext>
+            </a:extLst>
+          </p:cNvPr>
+          <p:cNvSpPr txBox="1"/>
+          <p:nvPr/>
+        </p:nvSpPr>
+        <p:spPr>
+          <a:xfrm>
+            <a:off x="7118569" y="4706820"/>
+            <a:ext cx="1599047" cy="369332"/>
+          </a:xfrm>
+          <a:prstGeom prst="rect">
+            <a:avLst/>
+          </a:prstGeom>
+          <a:noFill/>
+        </p:spPr>
+        <p:txBody>
+          <a:bodyPr wrap="square" rtlCol="0">
+            <a:spAutoFit/>
+          </a:bodyPr>
+          <a:lstStyle/>
+          <a:p>
+            <a:pPr algn="ctr"/>
+            <a:r>
+              <a:rPr lang="fr-FR" dirty="0"/>
+              <a:t>MIP 36h12 id 0</a:t>
+            </a:r>
+          </a:p>
+        </p:txBody>
+      </p:sp>
+    </p:spTree>
+    <p:extLst>
+      <p:ext uri="{BB962C8B-B14F-4D97-AF65-F5344CB8AC3E}">
+        <p14:creationId xmlns:p14="http://schemas.microsoft.com/office/powerpoint/2010/main" val="1843789732"/>
+      </p:ext>
+    </p:extLst>
+  </p:cSld>
+  <p:clrMapOvr>
+    <a:masterClrMapping/>
+  </p:clrMapOvr>
+</p:sld>
+</file>
+
+<file path=ppt/slides/slide3.xml><?xml version="1.0" encoding="utf-8"?>
+<p:sld xmlns:a="http://schemas.openxmlformats.org/drawingml/2006/main" xmlns:r="http://schemas.openxmlformats.org/officeDocument/2006/relationships" xmlns:p="http://schemas.openxmlformats.org/presentationml/2006/main">
+  <p:cSld>
+    <p:spTree>
+      <p:nvGrpSpPr>
+        <p:cNvPr id="1" name=""/>
+        <p:cNvGrpSpPr/>
+        <p:nvPr/>
+      </p:nvGrpSpPr>
+      <p:grpSpPr>
+        <a:xfrm>
+          <a:off x="0" y="0"/>
+          <a:ext cx="0" cy="0"/>
+          <a:chOff x="0" y="0"/>
+          <a:chExt cx="0" cy="0"/>
+        </a:xfrm>
+      </p:grpSpPr>
+      <p:pic>
+        <p:nvPicPr>
+          <p:cNvPr id="5" name="Image 4">
+            <a:extLst>
+              <a:ext uri="{FF2B5EF4-FFF2-40B4-BE49-F238E27FC236}">
+                <a16:creationId xmlns:a16="http://schemas.microsoft.com/office/drawing/2014/main" id="{D4E1B1B0-47FB-521E-97DB-D728ABD02559}"/>
+              </a:ext>
+            </a:extLst>
+          </p:cNvPr>
+          <p:cNvPicPr>
+            <a:picLocks noChangeAspect="1"/>
+          </p:cNvPicPr>
+          <p:nvPr/>
+        </p:nvPicPr>
+        <p:blipFill>
+          <a:blip r:embed="rId2"/>
+          <a:stretch>
+            <a:fillRect/>
+          </a:stretch>
+        </p:blipFill>
+        <p:spPr>
+          <a:xfrm>
+            <a:off x="3805940" y="1872342"/>
+            <a:ext cx="2294120" cy="2294120"/>
+          </a:xfrm>
+          <a:prstGeom prst="rect">
+            <a:avLst/>
+          </a:prstGeom>
+          <a:ln>
+            <a:solidFill>
+              <a:schemeClr val="accent1"/>
+            </a:solidFill>
+          </a:ln>
+        </p:spPr>
+      </p:pic>
+      <p:cxnSp>
+        <p:nvCxnSpPr>
+          <p:cNvPr id="7" name="Connecteur droit avec flèche 6">
+            <a:extLst>
+              <a:ext uri="{FF2B5EF4-FFF2-40B4-BE49-F238E27FC236}">
+                <a16:creationId xmlns:a16="http://schemas.microsoft.com/office/drawing/2014/main" id="{BF0C931B-4BF6-1FC1-A6D5-1481FAAFC5F5}"/>
+              </a:ext>
+            </a:extLst>
+          </p:cNvPr>
+          <p:cNvCxnSpPr>
+            <a:cxnSpLocks/>
+          </p:cNvCxnSpPr>
+          <p:nvPr/>
+        </p:nvCxnSpPr>
+        <p:spPr>
+          <a:xfrm>
+            <a:off x="4030717" y="4708628"/>
+            <a:ext cx="1834054" cy="0"/>
+          </a:xfrm>
+          <a:prstGeom prst="straightConnector1">
+            <a:avLst/>
+          </a:prstGeom>
+          <a:ln>
+            <a:headEnd type="triangle"/>
+            <a:tailEnd type="triangle"/>
+          </a:ln>
+        </p:spPr>
+        <p:style>
+          <a:lnRef idx="1">
+            <a:schemeClr val="accent1"/>
+          </a:lnRef>
+          <a:fillRef idx="0">
+            <a:schemeClr val="accent1"/>
+          </a:fillRef>
+          <a:effectRef idx="0">
+            <a:schemeClr val="accent1"/>
+          </a:effectRef>
+          <a:fontRef idx="minor">
+            <a:schemeClr val="tx1"/>
+          </a:fontRef>
+        </p:style>
+      </p:cxnSp>
+      <p:sp>
+        <p:nvSpPr>
+          <p:cNvPr id="8" name="ZoneTexte 7">
+            <a:extLst>
+              <a:ext uri="{FF2B5EF4-FFF2-40B4-BE49-F238E27FC236}">
+                <a16:creationId xmlns:a16="http://schemas.microsoft.com/office/drawing/2014/main" id="{6217703C-B8FC-EE52-7011-25FDB6D30A99}"/>
+              </a:ext>
+            </a:extLst>
+          </p:cNvPr>
+          <p:cNvSpPr txBox="1"/>
+          <p:nvPr/>
+        </p:nvSpPr>
+        <p:spPr>
+          <a:xfrm>
+            <a:off x="4498568" y="4334042"/>
+            <a:ext cx="895630" cy="369332"/>
+          </a:xfrm>
+          <a:prstGeom prst="rect">
+            <a:avLst/>
+          </a:prstGeom>
+          <a:noFill/>
+        </p:spPr>
+        <p:txBody>
+          <a:bodyPr wrap="none" rtlCol="0">
+            <a:spAutoFit/>
+          </a:bodyPr>
+          <a:lstStyle/>
+          <a:p>
+            <a:r>
+              <a:rPr lang="fr-FR" dirty="0"/>
+              <a:t>Tag size</a:t>
+            </a:r>
+          </a:p>
+        </p:txBody>
+      </p:sp>
+      <p:cxnSp>
+        <p:nvCxnSpPr>
+          <p:cNvPr id="10" name="Connecteur droit 9">
+            <a:extLst>
+              <a:ext uri="{FF2B5EF4-FFF2-40B4-BE49-F238E27FC236}">
+                <a16:creationId xmlns:a16="http://schemas.microsoft.com/office/drawing/2014/main" id="{B9B10394-CC87-D60E-FBE6-B37BA1934911}"/>
+              </a:ext>
+            </a:extLst>
+          </p:cNvPr>
+          <p:cNvCxnSpPr>
+            <a:cxnSpLocks/>
+          </p:cNvCxnSpPr>
+          <p:nvPr/>
+        </p:nvCxnSpPr>
+        <p:spPr>
+          <a:xfrm flipV="1">
+            <a:off x="4267199" y="1054821"/>
+            <a:ext cx="0" cy="1246944"/>
+          </a:xfrm>
+          <a:prstGeom prst="line">
+            <a:avLst/>
+          </a:prstGeom>
+          <a:ln>
+            <a:prstDash val="lgDashDot"/>
+          </a:ln>
+        </p:spPr>
+        <p:style>
+          <a:lnRef idx="1">
+            <a:schemeClr val="accent1"/>
+          </a:lnRef>
+          <a:fillRef idx="0">
+            <a:schemeClr val="accent1"/>
+          </a:fillRef>
+          <a:effectRef idx="0">
+            <a:schemeClr val="accent1"/>
+          </a:effectRef>
+          <a:fontRef idx="minor">
+            <a:schemeClr val="tx1"/>
+          </a:fontRef>
+        </p:style>
+      </p:cxnSp>
+      <p:cxnSp>
+        <p:nvCxnSpPr>
+          <p:cNvPr id="11" name="Connecteur droit 10">
+            <a:extLst>
+              <a:ext uri="{FF2B5EF4-FFF2-40B4-BE49-F238E27FC236}">
+                <a16:creationId xmlns:a16="http://schemas.microsoft.com/office/drawing/2014/main" id="{17FFD710-FEE2-8695-D184-DBE1C513BE5F}"/>
+              </a:ext>
+            </a:extLst>
+          </p:cNvPr>
+          <p:cNvCxnSpPr>
+            <a:cxnSpLocks/>
+          </p:cNvCxnSpPr>
+          <p:nvPr/>
+        </p:nvCxnSpPr>
+        <p:spPr>
+          <a:xfrm flipV="1">
+            <a:off x="4030717" y="1039053"/>
+            <a:ext cx="0" cy="3869278"/>
+          </a:xfrm>
+          <a:prstGeom prst="line">
+            <a:avLst/>
+          </a:prstGeom>
+          <a:ln>
+            <a:prstDash val="lgDashDot"/>
+          </a:ln>
+        </p:spPr>
+        <p:style>
+          <a:lnRef idx="1">
+            <a:schemeClr val="accent1"/>
+          </a:lnRef>
+          <a:fillRef idx="0">
+            <a:schemeClr val="accent1"/>
+          </a:fillRef>
+          <a:effectRef idx="0">
+            <a:schemeClr val="accent1"/>
+          </a:effectRef>
+          <a:fontRef idx="minor">
+            <a:schemeClr val="tx1"/>
+          </a:fontRef>
+        </p:style>
+      </p:cxnSp>
+      <p:cxnSp>
+        <p:nvCxnSpPr>
+          <p:cNvPr id="18" name="Connecteur droit 17">
+            <a:extLst>
+              <a:ext uri="{FF2B5EF4-FFF2-40B4-BE49-F238E27FC236}">
+                <a16:creationId xmlns:a16="http://schemas.microsoft.com/office/drawing/2014/main" id="{32B92A19-962A-660A-79DC-9E93763162E4}"/>
+              </a:ext>
+            </a:extLst>
+          </p:cNvPr>
+          <p:cNvCxnSpPr>
+            <a:cxnSpLocks/>
+          </p:cNvCxnSpPr>
+          <p:nvPr/>
+        </p:nvCxnSpPr>
+        <p:spPr>
+          <a:xfrm flipV="1">
+            <a:off x="3795430" y="1054821"/>
+            <a:ext cx="0" cy="817521"/>
+          </a:xfrm>
+          <a:prstGeom prst="line">
+            <a:avLst/>
+          </a:prstGeom>
+          <a:ln>
+            <a:prstDash val="lgDashDot"/>
+          </a:ln>
+        </p:spPr>
+        <p:style>
+          <a:lnRef idx="1">
+            <a:schemeClr val="accent1"/>
+          </a:lnRef>
+          <a:fillRef idx="0">
+            <a:schemeClr val="accent1"/>
+          </a:fillRef>
+          <a:effectRef idx="0">
+            <a:schemeClr val="accent1"/>
+          </a:effectRef>
+          <a:fontRef idx="minor">
+            <a:schemeClr val="tx1"/>
+          </a:fontRef>
+        </p:style>
+      </p:cxnSp>
+      <p:cxnSp>
+        <p:nvCxnSpPr>
+          <p:cNvPr id="19" name="Connecteur droit avec flèche 18">
+            <a:extLst>
+              <a:ext uri="{FF2B5EF4-FFF2-40B4-BE49-F238E27FC236}">
+                <a16:creationId xmlns:a16="http://schemas.microsoft.com/office/drawing/2014/main" id="{C3A60E4D-C4CA-6982-8A84-069CC9238B91}"/>
+              </a:ext>
+            </a:extLst>
+          </p:cNvPr>
+          <p:cNvCxnSpPr>
+            <a:cxnSpLocks/>
+          </p:cNvCxnSpPr>
+          <p:nvPr/>
+        </p:nvCxnSpPr>
+        <p:spPr>
+          <a:xfrm>
+            <a:off x="2532993" y="1413641"/>
+            <a:ext cx="1497724" cy="0"/>
+          </a:xfrm>
+          <a:prstGeom prst="straightConnector1">
+            <a:avLst/>
+          </a:prstGeom>
+          <a:ln>
+            <a:headEnd type="none"/>
+            <a:tailEnd type="triangle"/>
+          </a:ln>
+        </p:spPr>
+        <p:style>
+          <a:lnRef idx="1">
+            <a:schemeClr val="accent1"/>
+          </a:lnRef>
+          <a:fillRef idx="0">
+            <a:schemeClr val="accent1"/>
+          </a:fillRef>
+          <a:effectRef idx="0">
+            <a:schemeClr val="accent1"/>
+          </a:effectRef>
+          <a:fontRef idx="minor">
+            <a:schemeClr val="tx1"/>
+          </a:fontRef>
+        </p:style>
+      </p:cxnSp>
+      <p:cxnSp>
+        <p:nvCxnSpPr>
+          <p:cNvPr id="20" name="Connecteur droit avec flèche 19">
+            <a:extLst>
+              <a:ext uri="{FF2B5EF4-FFF2-40B4-BE49-F238E27FC236}">
+                <a16:creationId xmlns:a16="http://schemas.microsoft.com/office/drawing/2014/main" id="{2CAE5C96-2AE6-D4E5-5BA5-704EA3FA2CDF}"/>
+              </a:ext>
+            </a:extLst>
+          </p:cNvPr>
+          <p:cNvCxnSpPr>
+            <a:cxnSpLocks/>
+          </p:cNvCxnSpPr>
+          <p:nvPr/>
+        </p:nvCxnSpPr>
+        <p:spPr>
+          <a:xfrm>
+            <a:off x="2429227" y="1416006"/>
+            <a:ext cx="1376713" cy="0"/>
+          </a:xfrm>
+          <a:prstGeom prst="straightConnector1">
+            <a:avLst/>
+          </a:prstGeom>
+          <a:ln>
+            <a:headEnd type="none"/>
+            <a:tailEnd type="triangle"/>
+          </a:ln>
+        </p:spPr>
+        <p:style>
+          <a:lnRef idx="1">
+            <a:schemeClr val="accent1"/>
+          </a:lnRef>
+          <a:fillRef idx="0">
+            <a:schemeClr val="accent1"/>
+          </a:fillRef>
+          <a:effectRef idx="0">
+            <a:schemeClr val="accent1"/>
+          </a:effectRef>
+          <a:fontRef idx="minor">
+            <a:schemeClr val="tx1"/>
+          </a:fontRef>
+        </p:style>
+      </p:cxnSp>
+      <p:sp>
+        <p:nvSpPr>
+          <p:cNvPr id="22" name="ZoneTexte 21">
+            <a:extLst>
+              <a:ext uri="{FF2B5EF4-FFF2-40B4-BE49-F238E27FC236}">
+                <a16:creationId xmlns:a16="http://schemas.microsoft.com/office/drawing/2014/main" id="{3F95521A-4E0D-7BD6-7AE5-5EB4EC0561E5}"/>
+              </a:ext>
+            </a:extLst>
+          </p:cNvPr>
+          <p:cNvSpPr txBox="1"/>
+          <p:nvPr/>
+        </p:nvSpPr>
+        <p:spPr>
+          <a:xfrm>
+            <a:off x="2502386" y="750077"/>
+            <a:ext cx="1219886" cy="646331"/>
+          </a:xfrm>
+          <a:prstGeom prst="rect">
+            <a:avLst/>
+          </a:prstGeom>
+          <a:noFill/>
+        </p:spPr>
+        <p:txBody>
+          <a:bodyPr wrap="none" rtlCol="0">
+            <a:spAutoFit/>
+          </a:bodyPr>
+          <a:lstStyle/>
+          <a:p>
+            <a:pPr algn="ctr"/>
+            <a:r>
+              <a:rPr lang="fr-FR" dirty="0"/>
+              <a:t>White </a:t>
+            </a:r>
+          </a:p>
+          <a:p>
+            <a:r>
+              <a:rPr lang="fr-FR" dirty="0"/>
+              <a:t>border size</a:t>
+            </a:r>
+          </a:p>
+        </p:txBody>
+      </p:sp>
+      <p:sp>
+        <p:nvSpPr>
+          <p:cNvPr id="32" name="ZoneTexte 31">
+            <a:extLst>
+              <a:ext uri="{FF2B5EF4-FFF2-40B4-BE49-F238E27FC236}">
+                <a16:creationId xmlns:a16="http://schemas.microsoft.com/office/drawing/2014/main" id="{F9A4B1A2-51C3-85A5-E7C4-4FAD88219237}"/>
+              </a:ext>
+            </a:extLst>
+          </p:cNvPr>
+          <p:cNvSpPr txBox="1"/>
+          <p:nvPr/>
+        </p:nvSpPr>
+        <p:spPr>
+          <a:xfrm>
+            <a:off x="4405373" y="762055"/>
+            <a:ext cx="1219886" cy="646331"/>
+          </a:xfrm>
+          <a:prstGeom prst="rect">
+            <a:avLst/>
+          </a:prstGeom>
+          <a:noFill/>
+        </p:spPr>
+        <p:txBody>
+          <a:bodyPr wrap="none" rtlCol="0">
+            <a:spAutoFit/>
+          </a:bodyPr>
+          <a:lstStyle/>
+          <a:p>
+            <a:pPr algn="ctr"/>
+            <a:r>
+              <a:rPr lang="fr-FR" dirty="0"/>
+              <a:t>Black </a:t>
+            </a:r>
+          </a:p>
+          <a:p>
+            <a:r>
+              <a:rPr lang="fr-FR" dirty="0"/>
+              <a:t>border size</a:t>
+            </a:r>
+          </a:p>
+        </p:txBody>
+      </p:sp>
+      <p:cxnSp>
+        <p:nvCxnSpPr>
+          <p:cNvPr id="33" name="Connecteur droit avec flèche 32">
+            <a:extLst>
+              <a:ext uri="{FF2B5EF4-FFF2-40B4-BE49-F238E27FC236}">
+                <a16:creationId xmlns:a16="http://schemas.microsoft.com/office/drawing/2014/main" id="{C87D73AB-F20D-A362-5306-4CACD5DDDEE4}"/>
+              </a:ext>
+            </a:extLst>
+          </p:cNvPr>
+          <p:cNvCxnSpPr>
+            <a:cxnSpLocks/>
+          </p:cNvCxnSpPr>
+          <p:nvPr/>
+        </p:nvCxnSpPr>
+        <p:spPr>
+          <a:xfrm>
+            <a:off x="4030717" y="1416006"/>
+            <a:ext cx="1497724" cy="0"/>
+          </a:xfrm>
+          <a:prstGeom prst="straightConnector1">
+            <a:avLst/>
+          </a:prstGeom>
+          <a:ln>
+            <a:headEnd type="triangle"/>
+            <a:tailEnd type="none"/>
+          </a:ln>
+        </p:spPr>
+        <p:style>
+          <a:lnRef idx="1">
+            <a:schemeClr val="accent1"/>
+          </a:lnRef>
+          <a:fillRef idx="0">
+            <a:schemeClr val="accent1"/>
+          </a:fillRef>
+          <a:effectRef idx="0">
+            <a:schemeClr val="accent1"/>
+          </a:effectRef>
+          <a:fontRef idx="minor">
+            <a:schemeClr val="tx1"/>
+          </a:fontRef>
+        </p:style>
+      </p:cxnSp>
+      <p:cxnSp>
+        <p:nvCxnSpPr>
+          <p:cNvPr id="34" name="Connecteur droit avec flèche 33">
+            <a:extLst>
+              <a:ext uri="{FF2B5EF4-FFF2-40B4-BE49-F238E27FC236}">
+                <a16:creationId xmlns:a16="http://schemas.microsoft.com/office/drawing/2014/main" id="{EE19CCA8-E82F-0D32-78E2-19BEDC2F94DA}"/>
+              </a:ext>
+            </a:extLst>
+          </p:cNvPr>
+          <p:cNvCxnSpPr>
+            <a:cxnSpLocks/>
+          </p:cNvCxnSpPr>
+          <p:nvPr/>
+        </p:nvCxnSpPr>
+        <p:spPr>
+          <a:xfrm>
+            <a:off x="4265162" y="1413641"/>
+            <a:ext cx="1376713" cy="0"/>
+          </a:xfrm>
+          <a:prstGeom prst="straightConnector1">
+            <a:avLst/>
+          </a:prstGeom>
+          <a:ln>
+            <a:headEnd type="triangle"/>
+            <a:tailEnd type="none"/>
+          </a:ln>
+        </p:spPr>
+        <p:style>
+          <a:lnRef idx="1">
+            <a:schemeClr val="accent1"/>
+          </a:lnRef>
+          <a:fillRef idx="0">
+            <a:schemeClr val="accent1"/>
+          </a:fillRef>
+          <a:effectRef idx="0">
+            <a:schemeClr val="accent1"/>
+          </a:effectRef>
+          <a:fontRef idx="minor">
+            <a:schemeClr val="tx1"/>
+          </a:fontRef>
+        </p:style>
+      </p:cxnSp>
+      <p:cxnSp>
+        <p:nvCxnSpPr>
+          <p:cNvPr id="35" name="Connecteur droit 34">
+            <a:extLst>
+              <a:ext uri="{FF2B5EF4-FFF2-40B4-BE49-F238E27FC236}">
+                <a16:creationId xmlns:a16="http://schemas.microsoft.com/office/drawing/2014/main" id="{AA460304-9CF2-98D9-6201-DF494AF7B329}"/>
+              </a:ext>
+            </a:extLst>
+          </p:cNvPr>
+          <p:cNvCxnSpPr>
+            <a:cxnSpLocks/>
+          </p:cNvCxnSpPr>
+          <p:nvPr/>
+        </p:nvCxnSpPr>
+        <p:spPr>
+          <a:xfrm flipH="1" flipV="1">
+            <a:off x="5864771" y="3937000"/>
+            <a:ext cx="10509" cy="971331"/>
+          </a:xfrm>
+          <a:prstGeom prst="line">
+            <a:avLst/>
+          </a:prstGeom>
+          <a:ln>
+            <a:prstDash val="lgDashDot"/>
+          </a:ln>
+        </p:spPr>
+        <p:style>
+          <a:lnRef idx="1">
+            <a:schemeClr val="accent1"/>
+          </a:lnRef>
+          <a:fillRef idx="0">
+            <a:schemeClr val="accent1"/>
+          </a:fillRef>
+          <a:effectRef idx="0">
+            <a:schemeClr val="accent1"/>
+          </a:effectRef>
+          <a:fontRef idx="minor">
+            <a:schemeClr val="tx1"/>
+          </a:fontRef>
+        </p:style>
+      </p:cxnSp>
+    </p:spTree>
+    <p:extLst>
+      <p:ext uri="{BB962C8B-B14F-4D97-AF65-F5344CB8AC3E}">
+        <p14:creationId xmlns:p14="http://schemas.microsoft.com/office/powerpoint/2010/main" val="119302946"/>
       </p:ext>
     </p:extLst>
   </p:cSld>

</xml_diff>

<commit_message>
[MERGE] Fixed merge conflict with master
</commit_message>
<xml_diff>
--- a/doc/image/tutorial/detection/img-tag-frame.pptx
+++ b/doc/image/tutorial/detection/img-tag-frame.pptx
@@ -6,6 +6,8 @@
   </p:sldMasterIdLst>
   <p:sldIdLst>
     <p:sldId id="256" r:id="rId2"/>
+    <p:sldId id="257" r:id="rId3"/>
+    <p:sldId id="258" r:id="rId4"/>
   </p:sldIdLst>
   <p:sldSz cx="9906000" cy="6858000" type="A4"/>
   <p:notesSz cx="6858000" cy="9144000"/>
@@ -104,6 +106,11 @@
       </a:defRPr>
     </a:lvl9pPr>
   </p:defaultTextStyle>
+  <p:extLst>
+    <p:ext uri="{EFAFB233-063F-42B5-8137-9DF3F51BA10A}">
+      <p15:sldGuideLst xmlns:p15="http://schemas.microsoft.com/office/powerpoint/2012/main"/>
+    </p:ext>
+  </p:extLst>
 </p:presentation>
 </file>
 
@@ -238,7 +245,7 @@
           <a:p>
             <a:fld id="{A4E9012D-6EA8-574C-BB01-7AF471D0F086}" type="datetimeFigureOut">
               <a:rPr lang="fr-FR" smtClean="0"/>
-              <a:t>11/09/2024</a:t>
+              <a:t>31/03/2025</a:t>
             </a:fld>
             <a:endParaRPr lang="fr-FR"/>
           </a:p>
@@ -408,7 +415,7 @@
           <a:p>
             <a:fld id="{A4E9012D-6EA8-574C-BB01-7AF471D0F086}" type="datetimeFigureOut">
               <a:rPr lang="fr-FR" smtClean="0"/>
-              <a:t>11/09/2024</a:t>
+              <a:t>31/03/2025</a:t>
             </a:fld>
             <a:endParaRPr lang="fr-FR"/>
           </a:p>
@@ -588,7 +595,7 @@
           <a:p>
             <a:fld id="{A4E9012D-6EA8-574C-BB01-7AF471D0F086}" type="datetimeFigureOut">
               <a:rPr lang="fr-FR" smtClean="0"/>
-              <a:t>11/09/2024</a:t>
+              <a:t>31/03/2025</a:t>
             </a:fld>
             <a:endParaRPr lang="fr-FR"/>
           </a:p>
@@ -758,7 +765,7 @@
           <a:p>
             <a:fld id="{A4E9012D-6EA8-574C-BB01-7AF471D0F086}" type="datetimeFigureOut">
               <a:rPr lang="fr-FR" smtClean="0"/>
-              <a:t>11/09/2024</a:t>
+              <a:t>31/03/2025</a:t>
             </a:fld>
             <a:endParaRPr lang="fr-FR"/>
           </a:p>
@@ -1002,7 +1009,7 @@
           <a:p>
             <a:fld id="{A4E9012D-6EA8-574C-BB01-7AF471D0F086}" type="datetimeFigureOut">
               <a:rPr lang="fr-FR" smtClean="0"/>
-              <a:t>11/09/2024</a:t>
+              <a:t>31/03/2025</a:t>
             </a:fld>
             <a:endParaRPr lang="fr-FR"/>
           </a:p>
@@ -1234,7 +1241,7 @@
           <a:p>
             <a:fld id="{A4E9012D-6EA8-574C-BB01-7AF471D0F086}" type="datetimeFigureOut">
               <a:rPr lang="fr-FR" smtClean="0"/>
-              <a:t>11/09/2024</a:t>
+              <a:t>31/03/2025</a:t>
             </a:fld>
             <a:endParaRPr lang="fr-FR"/>
           </a:p>
@@ -1601,7 +1608,7 @@
           <a:p>
             <a:fld id="{A4E9012D-6EA8-574C-BB01-7AF471D0F086}" type="datetimeFigureOut">
               <a:rPr lang="fr-FR" smtClean="0"/>
-              <a:t>11/09/2024</a:t>
+              <a:t>31/03/2025</a:t>
             </a:fld>
             <a:endParaRPr lang="fr-FR"/>
           </a:p>
@@ -1719,7 +1726,7 @@
           <a:p>
             <a:fld id="{A4E9012D-6EA8-574C-BB01-7AF471D0F086}" type="datetimeFigureOut">
               <a:rPr lang="fr-FR" smtClean="0"/>
-              <a:t>11/09/2024</a:t>
+              <a:t>31/03/2025</a:t>
             </a:fld>
             <a:endParaRPr lang="fr-FR"/>
           </a:p>
@@ -1814,7 +1821,7 @@
           <a:p>
             <a:fld id="{A4E9012D-6EA8-574C-BB01-7AF471D0F086}" type="datetimeFigureOut">
               <a:rPr lang="fr-FR" smtClean="0"/>
-              <a:t>11/09/2024</a:t>
+              <a:t>31/03/2025</a:t>
             </a:fld>
             <a:endParaRPr lang="fr-FR"/>
           </a:p>
@@ -2091,7 +2098,7 @@
           <a:p>
             <a:fld id="{A4E9012D-6EA8-574C-BB01-7AF471D0F086}" type="datetimeFigureOut">
               <a:rPr lang="fr-FR" smtClean="0"/>
-              <a:t>11/09/2024</a:t>
+              <a:t>31/03/2025</a:t>
             </a:fld>
             <a:endParaRPr lang="fr-FR"/>
           </a:p>
@@ -2348,7 +2355,7 @@
           <a:p>
             <a:fld id="{A4E9012D-6EA8-574C-BB01-7AF471D0F086}" type="datetimeFigureOut">
               <a:rPr lang="fr-FR" smtClean="0"/>
-              <a:t>11/09/2024</a:t>
+              <a:t>31/03/2025</a:t>
             </a:fld>
             <a:endParaRPr lang="fr-FR"/>
           </a:p>
@@ -2561,7 +2568,7 @@
           <a:p>
             <a:fld id="{A4E9012D-6EA8-574C-BB01-7AF471D0F086}" type="datetimeFigureOut">
               <a:rPr lang="fr-FR" smtClean="0"/>
-              <a:t>11/09/2024</a:t>
+              <a:t>31/03/2025</a:t>
             </a:fld>
             <a:endParaRPr lang="fr-FR"/>
           </a:p>
@@ -2995,7 +3002,9 @@
             <a:avLst/>
           </a:prstGeom>
           <a:ln>
-            <a:noFill/>
+            <a:solidFill>
+              <a:schemeClr val="accent1"/>
+            </a:solidFill>
           </a:ln>
         </p:spPr>
       </p:pic>
@@ -3349,7 +3358,9 @@
             <a:avLst/>
           </a:prstGeom>
           <a:ln>
-            <a:noFill/>
+            <a:solidFill>
+              <a:schemeClr val="accent1"/>
+            </a:solidFill>
           </a:ln>
         </p:spPr>
       </p:pic>
@@ -4345,6 +4356,1134 @@
     <p:extLst>
       <p:ext uri="{BB962C8B-B14F-4D97-AF65-F5344CB8AC3E}">
         <p14:creationId xmlns:p14="http://schemas.microsoft.com/office/powerpoint/2010/main" val="2318027081"/>
+      </p:ext>
+    </p:extLst>
+  </p:cSld>
+  <p:clrMapOvr>
+    <a:masterClrMapping/>
+  </p:clrMapOvr>
+</p:sld>
+</file>
+
+<file path=ppt/slides/slide2.xml><?xml version="1.0" encoding="utf-8"?>
+<p:sld xmlns:a="http://schemas.openxmlformats.org/drawingml/2006/main" xmlns:r="http://schemas.openxmlformats.org/officeDocument/2006/relationships" xmlns:p="http://schemas.openxmlformats.org/presentationml/2006/main">
+  <p:cSld>
+    <p:spTree>
+      <p:nvGrpSpPr>
+        <p:cNvPr id="1" name=""/>
+        <p:cNvGrpSpPr/>
+        <p:nvPr/>
+      </p:nvGrpSpPr>
+      <p:grpSpPr>
+        <a:xfrm>
+          <a:off x="0" y="0"/>
+          <a:ext cx="0" cy="0"/>
+          <a:chOff x="0" y="0"/>
+          <a:chExt cx="0" cy="0"/>
+        </a:xfrm>
+      </p:grpSpPr>
+      <p:pic>
+        <p:nvPicPr>
+          <p:cNvPr id="5" name="Image 4">
+            <a:extLst>
+              <a:ext uri="{FF2B5EF4-FFF2-40B4-BE49-F238E27FC236}">
+                <a16:creationId xmlns:a16="http://schemas.microsoft.com/office/drawing/2014/main" id="{32C45B6A-E963-CE90-DB94-438B75167000}"/>
+              </a:ext>
+            </a:extLst>
+          </p:cNvPr>
+          <p:cNvPicPr>
+            <a:picLocks noChangeAspect="1"/>
+          </p:cNvPicPr>
+          <p:nvPr/>
+        </p:nvPicPr>
+        <p:blipFill>
+          <a:blip r:embed="rId2"/>
+          <a:stretch>
+            <a:fillRect/>
+          </a:stretch>
+        </p:blipFill>
+        <p:spPr>
+          <a:xfrm>
+            <a:off x="720000" y="720000"/>
+            <a:ext cx="1436190" cy="1440000"/>
+          </a:xfrm>
+          <a:prstGeom prst="rect">
+            <a:avLst/>
+          </a:prstGeom>
+        </p:spPr>
+      </p:pic>
+      <p:sp>
+        <p:nvSpPr>
+          <p:cNvPr id="6" name="ZoneTexte 5">
+            <a:extLst>
+              <a:ext uri="{FF2B5EF4-FFF2-40B4-BE49-F238E27FC236}">
+                <a16:creationId xmlns:a16="http://schemas.microsoft.com/office/drawing/2014/main" id="{CA4E19CC-EBC2-B5CE-27D5-228017BF580D}"/>
+              </a:ext>
+            </a:extLst>
+          </p:cNvPr>
+          <p:cNvSpPr txBox="1"/>
+          <p:nvPr/>
+        </p:nvSpPr>
+        <p:spPr>
+          <a:xfrm>
+            <a:off x="720000" y="2311370"/>
+            <a:ext cx="1396265" cy="369332"/>
+          </a:xfrm>
+          <a:prstGeom prst="rect">
+            <a:avLst/>
+          </a:prstGeom>
+          <a:noFill/>
+        </p:spPr>
+        <p:txBody>
+          <a:bodyPr wrap="square" rtlCol="0">
+            <a:spAutoFit/>
+          </a:bodyPr>
+          <a:lstStyle/>
+          <a:p>
+            <a:pPr algn="ctr"/>
+            <a:r>
+              <a:rPr lang="fr-FR" dirty="0"/>
+              <a:t>16h5 id 0</a:t>
+            </a:r>
+          </a:p>
+        </p:txBody>
+      </p:sp>
+      <p:pic>
+        <p:nvPicPr>
+          <p:cNvPr id="8" name="Image 7">
+            <a:extLst>
+              <a:ext uri="{FF2B5EF4-FFF2-40B4-BE49-F238E27FC236}">
+                <a16:creationId xmlns:a16="http://schemas.microsoft.com/office/drawing/2014/main" id="{28209397-B52B-214D-5E1B-2E06397961FE}"/>
+              </a:ext>
+            </a:extLst>
+          </p:cNvPr>
+          <p:cNvPicPr>
+            <a:picLocks noChangeAspect="1"/>
+          </p:cNvPicPr>
+          <p:nvPr/>
+        </p:nvPicPr>
+        <p:blipFill>
+          <a:blip r:embed="rId3"/>
+          <a:stretch>
+            <a:fillRect/>
+          </a:stretch>
+        </p:blipFill>
+        <p:spPr>
+          <a:xfrm>
+            <a:off x="2880000" y="720000"/>
+            <a:ext cx="1436190" cy="1440000"/>
+          </a:xfrm>
+          <a:prstGeom prst="rect">
+            <a:avLst/>
+          </a:prstGeom>
+        </p:spPr>
+      </p:pic>
+      <p:sp>
+        <p:nvSpPr>
+          <p:cNvPr id="9" name="ZoneTexte 8">
+            <a:extLst>
+              <a:ext uri="{FF2B5EF4-FFF2-40B4-BE49-F238E27FC236}">
+                <a16:creationId xmlns:a16="http://schemas.microsoft.com/office/drawing/2014/main" id="{6F13414F-10E0-E5ED-8F26-5D0B59B16ADA}"/>
+              </a:ext>
+            </a:extLst>
+          </p:cNvPr>
+          <p:cNvSpPr txBox="1"/>
+          <p:nvPr/>
+        </p:nvSpPr>
+        <p:spPr>
+          <a:xfrm>
+            <a:off x="2880000" y="2311370"/>
+            <a:ext cx="1436190" cy="369332"/>
+          </a:xfrm>
+          <a:prstGeom prst="rect">
+            <a:avLst/>
+          </a:prstGeom>
+          <a:noFill/>
+        </p:spPr>
+        <p:txBody>
+          <a:bodyPr wrap="square" rtlCol="0">
+            <a:spAutoFit/>
+          </a:bodyPr>
+          <a:lstStyle/>
+          <a:p>
+            <a:pPr algn="ctr"/>
+            <a:r>
+              <a:rPr lang="fr-FR" dirty="0"/>
+              <a:t>25h9 id 0</a:t>
+            </a:r>
+          </a:p>
+        </p:txBody>
+      </p:sp>
+      <p:pic>
+        <p:nvPicPr>
+          <p:cNvPr id="11" name="Image 10">
+            <a:extLst>
+              <a:ext uri="{FF2B5EF4-FFF2-40B4-BE49-F238E27FC236}">
+                <a16:creationId xmlns:a16="http://schemas.microsoft.com/office/drawing/2014/main" id="{4F657AB9-52CA-F2B0-55C7-A27376B0D90B}"/>
+              </a:ext>
+            </a:extLst>
+          </p:cNvPr>
+          <p:cNvPicPr>
+            <a:picLocks noChangeAspect="1"/>
+          </p:cNvPicPr>
+          <p:nvPr/>
+        </p:nvPicPr>
+        <p:blipFill>
+          <a:blip r:embed="rId4"/>
+          <a:stretch>
+            <a:fillRect/>
+          </a:stretch>
+        </p:blipFill>
+        <p:spPr>
+          <a:xfrm>
+            <a:off x="5040000" y="720000"/>
+            <a:ext cx="1436191" cy="1440000"/>
+          </a:xfrm>
+          <a:prstGeom prst="rect">
+            <a:avLst/>
+          </a:prstGeom>
+        </p:spPr>
+      </p:pic>
+      <p:sp>
+        <p:nvSpPr>
+          <p:cNvPr id="12" name="ZoneTexte 11">
+            <a:extLst>
+              <a:ext uri="{FF2B5EF4-FFF2-40B4-BE49-F238E27FC236}">
+                <a16:creationId xmlns:a16="http://schemas.microsoft.com/office/drawing/2014/main" id="{341599F7-1A45-673B-419B-692DF2C1548B}"/>
+              </a:ext>
+            </a:extLst>
+          </p:cNvPr>
+          <p:cNvSpPr txBox="1"/>
+          <p:nvPr/>
+        </p:nvSpPr>
+        <p:spPr>
+          <a:xfrm>
+            <a:off x="5040000" y="2311370"/>
+            <a:ext cx="1436190" cy="369332"/>
+          </a:xfrm>
+          <a:prstGeom prst="rect">
+            <a:avLst/>
+          </a:prstGeom>
+          <a:noFill/>
+        </p:spPr>
+        <p:txBody>
+          <a:bodyPr wrap="square" rtlCol="0">
+            <a:spAutoFit/>
+          </a:bodyPr>
+          <a:lstStyle/>
+          <a:p>
+            <a:pPr algn="ctr"/>
+            <a:r>
+              <a:rPr lang="fr-FR" dirty="0"/>
+              <a:t>36h10 id 0</a:t>
+            </a:r>
+          </a:p>
+        </p:txBody>
+      </p:sp>
+      <p:pic>
+        <p:nvPicPr>
+          <p:cNvPr id="14" name="Image 13">
+            <a:extLst>
+              <a:ext uri="{FF2B5EF4-FFF2-40B4-BE49-F238E27FC236}">
+                <a16:creationId xmlns:a16="http://schemas.microsoft.com/office/drawing/2014/main" id="{A7B4603B-0B0C-DE54-5F28-CF3626A7A03F}"/>
+              </a:ext>
+            </a:extLst>
+          </p:cNvPr>
+          <p:cNvPicPr>
+            <a:picLocks noChangeAspect="1"/>
+          </p:cNvPicPr>
+          <p:nvPr/>
+        </p:nvPicPr>
+        <p:blipFill>
+          <a:blip r:embed="rId5"/>
+          <a:stretch>
+            <a:fillRect/>
+          </a:stretch>
+        </p:blipFill>
+        <p:spPr>
+          <a:xfrm>
+            <a:off x="7200000" y="720000"/>
+            <a:ext cx="1436191" cy="1440000"/>
+          </a:xfrm>
+          <a:prstGeom prst="rect">
+            <a:avLst/>
+          </a:prstGeom>
+        </p:spPr>
+      </p:pic>
+      <p:sp>
+        <p:nvSpPr>
+          <p:cNvPr id="15" name="ZoneTexte 14">
+            <a:extLst>
+              <a:ext uri="{FF2B5EF4-FFF2-40B4-BE49-F238E27FC236}">
+                <a16:creationId xmlns:a16="http://schemas.microsoft.com/office/drawing/2014/main" id="{7092D9E7-A16F-DA78-8282-27B7A1BAA128}"/>
+              </a:ext>
+            </a:extLst>
+          </p:cNvPr>
+          <p:cNvSpPr txBox="1"/>
+          <p:nvPr/>
+        </p:nvSpPr>
+        <p:spPr>
+          <a:xfrm>
+            <a:off x="7199999" y="2311370"/>
+            <a:ext cx="1436189" cy="369332"/>
+          </a:xfrm>
+          <a:prstGeom prst="rect">
+            <a:avLst/>
+          </a:prstGeom>
+          <a:noFill/>
+        </p:spPr>
+        <p:txBody>
+          <a:bodyPr wrap="square" rtlCol="0">
+            <a:spAutoFit/>
+          </a:bodyPr>
+          <a:lstStyle/>
+          <a:p>
+            <a:pPr algn="ctr"/>
+            <a:r>
+              <a:rPr lang="fr-FR" dirty="0"/>
+              <a:t>36h11 id 0</a:t>
+            </a:r>
+          </a:p>
+        </p:txBody>
+      </p:sp>
+      <p:pic>
+        <p:nvPicPr>
+          <p:cNvPr id="17" name="Image 16">
+            <a:extLst>
+              <a:ext uri="{FF2B5EF4-FFF2-40B4-BE49-F238E27FC236}">
+                <a16:creationId xmlns:a16="http://schemas.microsoft.com/office/drawing/2014/main" id="{079B5830-B0EB-0F7A-F17D-1777AD6F3D4F}"/>
+              </a:ext>
+            </a:extLst>
+          </p:cNvPr>
+          <p:cNvPicPr>
+            <a:picLocks noChangeAspect="1"/>
+          </p:cNvPicPr>
+          <p:nvPr/>
+        </p:nvPicPr>
+        <p:blipFill>
+          <a:blip r:embed="rId6"/>
+          <a:stretch>
+            <a:fillRect/>
+          </a:stretch>
+        </p:blipFill>
+        <p:spPr>
+          <a:xfrm>
+            <a:off x="720000" y="3090157"/>
+            <a:ext cx="1436191" cy="1440000"/>
+          </a:xfrm>
+          <a:prstGeom prst="rect">
+            <a:avLst/>
+          </a:prstGeom>
+        </p:spPr>
+      </p:pic>
+      <p:sp>
+        <p:nvSpPr>
+          <p:cNvPr id="18" name="ZoneTexte 17">
+            <a:extLst>
+              <a:ext uri="{FF2B5EF4-FFF2-40B4-BE49-F238E27FC236}">
+                <a16:creationId xmlns:a16="http://schemas.microsoft.com/office/drawing/2014/main" id="{83308DFE-E83A-AAB7-1033-71C4A5697BAF}"/>
+              </a:ext>
+            </a:extLst>
+          </p:cNvPr>
+          <p:cNvSpPr txBox="1"/>
+          <p:nvPr/>
+        </p:nvSpPr>
+        <p:spPr>
+          <a:xfrm>
+            <a:off x="591893" y="4706820"/>
+            <a:ext cx="1652478" cy="369332"/>
+          </a:xfrm>
+          <a:prstGeom prst="rect">
+            <a:avLst/>
+          </a:prstGeom>
+          <a:noFill/>
+        </p:spPr>
+        <p:txBody>
+          <a:bodyPr wrap="square" rtlCol="0">
+            <a:spAutoFit/>
+          </a:bodyPr>
+          <a:lstStyle/>
+          <a:p>
+            <a:pPr algn="ctr"/>
+            <a:r>
+              <a:rPr lang="fr-FR" dirty="0" err="1"/>
+              <a:t>ArUco</a:t>
+            </a:r>
+            <a:r>
+              <a:rPr lang="fr-FR" dirty="0"/>
+              <a:t> 4x4 id 0</a:t>
+            </a:r>
+          </a:p>
+        </p:txBody>
+      </p:sp>
+      <p:pic>
+        <p:nvPicPr>
+          <p:cNvPr id="20" name="Image 19">
+            <a:extLst>
+              <a:ext uri="{FF2B5EF4-FFF2-40B4-BE49-F238E27FC236}">
+                <a16:creationId xmlns:a16="http://schemas.microsoft.com/office/drawing/2014/main" id="{3E9AE577-480C-0184-373E-EBF9D1A997F2}"/>
+              </a:ext>
+            </a:extLst>
+          </p:cNvPr>
+          <p:cNvPicPr>
+            <a:picLocks noChangeAspect="1"/>
+          </p:cNvPicPr>
+          <p:nvPr/>
+        </p:nvPicPr>
+        <p:blipFill>
+          <a:blip r:embed="rId7"/>
+          <a:stretch>
+            <a:fillRect/>
+          </a:stretch>
+        </p:blipFill>
+        <p:spPr>
+          <a:xfrm>
+            <a:off x="2880000" y="3149481"/>
+            <a:ext cx="1436191" cy="1440000"/>
+          </a:xfrm>
+          <a:prstGeom prst="rect">
+            <a:avLst/>
+          </a:prstGeom>
+        </p:spPr>
+      </p:pic>
+      <p:sp>
+        <p:nvSpPr>
+          <p:cNvPr id="21" name="ZoneTexte 20">
+            <a:extLst>
+              <a:ext uri="{FF2B5EF4-FFF2-40B4-BE49-F238E27FC236}">
+                <a16:creationId xmlns:a16="http://schemas.microsoft.com/office/drawing/2014/main" id="{C549AB15-22CF-5DB4-EF76-D8F46A57C515}"/>
+              </a:ext>
+            </a:extLst>
+          </p:cNvPr>
+          <p:cNvSpPr txBox="1"/>
+          <p:nvPr/>
+        </p:nvSpPr>
+        <p:spPr>
+          <a:xfrm>
+            <a:off x="2769282" y="4706820"/>
+            <a:ext cx="1599047" cy="369332"/>
+          </a:xfrm>
+          <a:prstGeom prst="rect">
+            <a:avLst/>
+          </a:prstGeom>
+          <a:noFill/>
+        </p:spPr>
+        <p:txBody>
+          <a:bodyPr wrap="square" rtlCol="0">
+            <a:spAutoFit/>
+          </a:bodyPr>
+          <a:lstStyle/>
+          <a:p>
+            <a:pPr algn="ctr"/>
+            <a:r>
+              <a:rPr lang="fr-FR" dirty="0" err="1"/>
+              <a:t>ArUco</a:t>
+            </a:r>
+            <a:r>
+              <a:rPr lang="fr-FR" dirty="0"/>
+              <a:t> 5x5 id 0</a:t>
+            </a:r>
+          </a:p>
+        </p:txBody>
+      </p:sp>
+      <p:pic>
+        <p:nvPicPr>
+          <p:cNvPr id="23" name="Image 22">
+            <a:extLst>
+              <a:ext uri="{FF2B5EF4-FFF2-40B4-BE49-F238E27FC236}">
+                <a16:creationId xmlns:a16="http://schemas.microsoft.com/office/drawing/2014/main" id="{1E99F94D-B36D-97FC-F0A2-F697A0A5837B}"/>
+              </a:ext>
+            </a:extLst>
+          </p:cNvPr>
+          <p:cNvPicPr>
+            <a:picLocks noChangeAspect="1"/>
+          </p:cNvPicPr>
+          <p:nvPr/>
+        </p:nvPicPr>
+        <p:blipFill>
+          <a:blip r:embed="rId8"/>
+          <a:stretch>
+            <a:fillRect/>
+          </a:stretch>
+        </p:blipFill>
+        <p:spPr>
+          <a:xfrm>
+            <a:off x="5040000" y="3090157"/>
+            <a:ext cx="1472095" cy="1476000"/>
+          </a:xfrm>
+          <a:prstGeom prst="rect">
+            <a:avLst/>
+          </a:prstGeom>
+        </p:spPr>
+      </p:pic>
+      <p:sp>
+        <p:nvSpPr>
+          <p:cNvPr id="24" name="ZoneTexte 23">
+            <a:extLst>
+              <a:ext uri="{FF2B5EF4-FFF2-40B4-BE49-F238E27FC236}">
+                <a16:creationId xmlns:a16="http://schemas.microsoft.com/office/drawing/2014/main" id="{8BB17CF4-0CDD-1F77-17C1-D8BC80BDDAF9}"/>
+              </a:ext>
+            </a:extLst>
+          </p:cNvPr>
+          <p:cNvSpPr txBox="1"/>
+          <p:nvPr/>
+        </p:nvSpPr>
+        <p:spPr>
+          <a:xfrm>
+            <a:off x="4953000" y="4706820"/>
+            <a:ext cx="1599047" cy="369332"/>
+          </a:xfrm>
+          <a:prstGeom prst="rect">
+            <a:avLst/>
+          </a:prstGeom>
+          <a:noFill/>
+        </p:spPr>
+        <p:txBody>
+          <a:bodyPr wrap="square" rtlCol="0">
+            <a:spAutoFit/>
+          </a:bodyPr>
+          <a:lstStyle/>
+          <a:p>
+            <a:pPr algn="ctr"/>
+            <a:r>
+              <a:rPr lang="fr-FR" dirty="0" err="1"/>
+              <a:t>ArUco</a:t>
+            </a:r>
+            <a:r>
+              <a:rPr lang="fr-FR" dirty="0"/>
+              <a:t> 6x6 id 0</a:t>
+            </a:r>
+          </a:p>
+        </p:txBody>
+      </p:sp>
+      <p:pic>
+        <p:nvPicPr>
+          <p:cNvPr id="26" name="Image 25">
+            <a:extLst>
+              <a:ext uri="{FF2B5EF4-FFF2-40B4-BE49-F238E27FC236}">
+                <a16:creationId xmlns:a16="http://schemas.microsoft.com/office/drawing/2014/main" id="{B5C3920C-4C4F-B3A4-C597-7BC6F4801D20}"/>
+              </a:ext>
+            </a:extLst>
+          </p:cNvPr>
+          <p:cNvPicPr>
+            <a:picLocks noChangeAspect="1"/>
+          </p:cNvPicPr>
+          <p:nvPr/>
+        </p:nvPicPr>
+        <p:blipFill>
+          <a:blip r:embed="rId9"/>
+          <a:stretch>
+            <a:fillRect/>
+          </a:stretch>
+        </p:blipFill>
+        <p:spPr>
+          <a:xfrm>
+            <a:off x="7200000" y="3090158"/>
+            <a:ext cx="1472095" cy="1476000"/>
+          </a:xfrm>
+          <a:prstGeom prst="rect">
+            <a:avLst/>
+          </a:prstGeom>
+        </p:spPr>
+      </p:pic>
+      <p:sp>
+        <p:nvSpPr>
+          <p:cNvPr id="27" name="ZoneTexte 26">
+            <a:extLst>
+              <a:ext uri="{FF2B5EF4-FFF2-40B4-BE49-F238E27FC236}">
+                <a16:creationId xmlns:a16="http://schemas.microsoft.com/office/drawing/2014/main" id="{156CA3DD-82A5-5DF7-3215-7B12C520AA9C}"/>
+              </a:ext>
+            </a:extLst>
+          </p:cNvPr>
+          <p:cNvSpPr txBox="1"/>
+          <p:nvPr/>
+        </p:nvSpPr>
+        <p:spPr>
+          <a:xfrm>
+            <a:off x="7118569" y="4706820"/>
+            <a:ext cx="1599047" cy="369332"/>
+          </a:xfrm>
+          <a:prstGeom prst="rect">
+            <a:avLst/>
+          </a:prstGeom>
+          <a:noFill/>
+        </p:spPr>
+        <p:txBody>
+          <a:bodyPr wrap="square" rtlCol="0">
+            <a:spAutoFit/>
+          </a:bodyPr>
+          <a:lstStyle/>
+          <a:p>
+            <a:pPr algn="ctr"/>
+            <a:r>
+              <a:rPr lang="fr-FR" dirty="0"/>
+              <a:t>MIP 36h12 id 0</a:t>
+            </a:r>
+          </a:p>
+        </p:txBody>
+      </p:sp>
+    </p:spTree>
+    <p:extLst>
+      <p:ext uri="{BB962C8B-B14F-4D97-AF65-F5344CB8AC3E}">
+        <p14:creationId xmlns:p14="http://schemas.microsoft.com/office/powerpoint/2010/main" val="1843789732"/>
+      </p:ext>
+    </p:extLst>
+  </p:cSld>
+  <p:clrMapOvr>
+    <a:masterClrMapping/>
+  </p:clrMapOvr>
+</p:sld>
+</file>
+
+<file path=ppt/slides/slide3.xml><?xml version="1.0" encoding="utf-8"?>
+<p:sld xmlns:a="http://schemas.openxmlformats.org/drawingml/2006/main" xmlns:r="http://schemas.openxmlformats.org/officeDocument/2006/relationships" xmlns:p="http://schemas.openxmlformats.org/presentationml/2006/main">
+  <p:cSld>
+    <p:spTree>
+      <p:nvGrpSpPr>
+        <p:cNvPr id="1" name=""/>
+        <p:cNvGrpSpPr/>
+        <p:nvPr/>
+      </p:nvGrpSpPr>
+      <p:grpSpPr>
+        <a:xfrm>
+          <a:off x="0" y="0"/>
+          <a:ext cx="0" cy="0"/>
+          <a:chOff x="0" y="0"/>
+          <a:chExt cx="0" cy="0"/>
+        </a:xfrm>
+      </p:grpSpPr>
+      <p:pic>
+        <p:nvPicPr>
+          <p:cNvPr id="5" name="Image 4">
+            <a:extLst>
+              <a:ext uri="{FF2B5EF4-FFF2-40B4-BE49-F238E27FC236}">
+                <a16:creationId xmlns:a16="http://schemas.microsoft.com/office/drawing/2014/main" id="{D4E1B1B0-47FB-521E-97DB-D728ABD02559}"/>
+              </a:ext>
+            </a:extLst>
+          </p:cNvPr>
+          <p:cNvPicPr>
+            <a:picLocks noChangeAspect="1"/>
+          </p:cNvPicPr>
+          <p:nvPr/>
+        </p:nvPicPr>
+        <p:blipFill>
+          <a:blip r:embed="rId2"/>
+          <a:stretch>
+            <a:fillRect/>
+          </a:stretch>
+        </p:blipFill>
+        <p:spPr>
+          <a:xfrm>
+            <a:off x="3805940" y="1872342"/>
+            <a:ext cx="2294120" cy="2294120"/>
+          </a:xfrm>
+          <a:prstGeom prst="rect">
+            <a:avLst/>
+          </a:prstGeom>
+          <a:ln>
+            <a:solidFill>
+              <a:schemeClr val="accent1"/>
+            </a:solidFill>
+          </a:ln>
+        </p:spPr>
+      </p:pic>
+      <p:cxnSp>
+        <p:nvCxnSpPr>
+          <p:cNvPr id="7" name="Connecteur droit avec flèche 6">
+            <a:extLst>
+              <a:ext uri="{FF2B5EF4-FFF2-40B4-BE49-F238E27FC236}">
+                <a16:creationId xmlns:a16="http://schemas.microsoft.com/office/drawing/2014/main" id="{BF0C931B-4BF6-1FC1-A6D5-1481FAAFC5F5}"/>
+              </a:ext>
+            </a:extLst>
+          </p:cNvPr>
+          <p:cNvCxnSpPr>
+            <a:cxnSpLocks/>
+          </p:cNvCxnSpPr>
+          <p:nvPr/>
+        </p:nvCxnSpPr>
+        <p:spPr>
+          <a:xfrm>
+            <a:off x="4030717" y="4708628"/>
+            <a:ext cx="1834054" cy="0"/>
+          </a:xfrm>
+          <a:prstGeom prst="straightConnector1">
+            <a:avLst/>
+          </a:prstGeom>
+          <a:ln>
+            <a:headEnd type="triangle"/>
+            <a:tailEnd type="triangle"/>
+          </a:ln>
+        </p:spPr>
+        <p:style>
+          <a:lnRef idx="1">
+            <a:schemeClr val="accent1"/>
+          </a:lnRef>
+          <a:fillRef idx="0">
+            <a:schemeClr val="accent1"/>
+          </a:fillRef>
+          <a:effectRef idx="0">
+            <a:schemeClr val="accent1"/>
+          </a:effectRef>
+          <a:fontRef idx="minor">
+            <a:schemeClr val="tx1"/>
+          </a:fontRef>
+        </p:style>
+      </p:cxnSp>
+      <p:sp>
+        <p:nvSpPr>
+          <p:cNvPr id="8" name="ZoneTexte 7">
+            <a:extLst>
+              <a:ext uri="{FF2B5EF4-FFF2-40B4-BE49-F238E27FC236}">
+                <a16:creationId xmlns:a16="http://schemas.microsoft.com/office/drawing/2014/main" id="{6217703C-B8FC-EE52-7011-25FDB6D30A99}"/>
+              </a:ext>
+            </a:extLst>
+          </p:cNvPr>
+          <p:cNvSpPr txBox="1"/>
+          <p:nvPr/>
+        </p:nvSpPr>
+        <p:spPr>
+          <a:xfrm>
+            <a:off x="4498568" y="4334042"/>
+            <a:ext cx="895630" cy="369332"/>
+          </a:xfrm>
+          <a:prstGeom prst="rect">
+            <a:avLst/>
+          </a:prstGeom>
+          <a:noFill/>
+        </p:spPr>
+        <p:txBody>
+          <a:bodyPr wrap="none" rtlCol="0">
+            <a:spAutoFit/>
+          </a:bodyPr>
+          <a:lstStyle/>
+          <a:p>
+            <a:r>
+              <a:rPr lang="fr-FR" dirty="0"/>
+              <a:t>Tag size</a:t>
+            </a:r>
+          </a:p>
+        </p:txBody>
+      </p:sp>
+      <p:cxnSp>
+        <p:nvCxnSpPr>
+          <p:cNvPr id="10" name="Connecteur droit 9">
+            <a:extLst>
+              <a:ext uri="{FF2B5EF4-FFF2-40B4-BE49-F238E27FC236}">
+                <a16:creationId xmlns:a16="http://schemas.microsoft.com/office/drawing/2014/main" id="{B9B10394-CC87-D60E-FBE6-B37BA1934911}"/>
+              </a:ext>
+            </a:extLst>
+          </p:cNvPr>
+          <p:cNvCxnSpPr>
+            <a:cxnSpLocks/>
+          </p:cNvCxnSpPr>
+          <p:nvPr/>
+        </p:nvCxnSpPr>
+        <p:spPr>
+          <a:xfrm flipV="1">
+            <a:off x="4267199" y="1054821"/>
+            <a:ext cx="0" cy="1246944"/>
+          </a:xfrm>
+          <a:prstGeom prst="line">
+            <a:avLst/>
+          </a:prstGeom>
+          <a:ln>
+            <a:prstDash val="lgDashDot"/>
+          </a:ln>
+        </p:spPr>
+        <p:style>
+          <a:lnRef idx="1">
+            <a:schemeClr val="accent1"/>
+          </a:lnRef>
+          <a:fillRef idx="0">
+            <a:schemeClr val="accent1"/>
+          </a:fillRef>
+          <a:effectRef idx="0">
+            <a:schemeClr val="accent1"/>
+          </a:effectRef>
+          <a:fontRef idx="minor">
+            <a:schemeClr val="tx1"/>
+          </a:fontRef>
+        </p:style>
+      </p:cxnSp>
+      <p:cxnSp>
+        <p:nvCxnSpPr>
+          <p:cNvPr id="11" name="Connecteur droit 10">
+            <a:extLst>
+              <a:ext uri="{FF2B5EF4-FFF2-40B4-BE49-F238E27FC236}">
+                <a16:creationId xmlns:a16="http://schemas.microsoft.com/office/drawing/2014/main" id="{17FFD710-FEE2-8695-D184-DBE1C513BE5F}"/>
+              </a:ext>
+            </a:extLst>
+          </p:cNvPr>
+          <p:cNvCxnSpPr>
+            <a:cxnSpLocks/>
+          </p:cNvCxnSpPr>
+          <p:nvPr/>
+        </p:nvCxnSpPr>
+        <p:spPr>
+          <a:xfrm flipV="1">
+            <a:off x="4030717" y="1039053"/>
+            <a:ext cx="0" cy="3869278"/>
+          </a:xfrm>
+          <a:prstGeom prst="line">
+            <a:avLst/>
+          </a:prstGeom>
+          <a:ln>
+            <a:prstDash val="lgDashDot"/>
+          </a:ln>
+        </p:spPr>
+        <p:style>
+          <a:lnRef idx="1">
+            <a:schemeClr val="accent1"/>
+          </a:lnRef>
+          <a:fillRef idx="0">
+            <a:schemeClr val="accent1"/>
+          </a:fillRef>
+          <a:effectRef idx="0">
+            <a:schemeClr val="accent1"/>
+          </a:effectRef>
+          <a:fontRef idx="minor">
+            <a:schemeClr val="tx1"/>
+          </a:fontRef>
+        </p:style>
+      </p:cxnSp>
+      <p:cxnSp>
+        <p:nvCxnSpPr>
+          <p:cNvPr id="18" name="Connecteur droit 17">
+            <a:extLst>
+              <a:ext uri="{FF2B5EF4-FFF2-40B4-BE49-F238E27FC236}">
+                <a16:creationId xmlns:a16="http://schemas.microsoft.com/office/drawing/2014/main" id="{32B92A19-962A-660A-79DC-9E93763162E4}"/>
+              </a:ext>
+            </a:extLst>
+          </p:cNvPr>
+          <p:cNvCxnSpPr>
+            <a:cxnSpLocks/>
+          </p:cNvCxnSpPr>
+          <p:nvPr/>
+        </p:nvCxnSpPr>
+        <p:spPr>
+          <a:xfrm flipV="1">
+            <a:off x="3795430" y="1054821"/>
+            <a:ext cx="0" cy="817521"/>
+          </a:xfrm>
+          <a:prstGeom prst="line">
+            <a:avLst/>
+          </a:prstGeom>
+          <a:ln>
+            <a:prstDash val="lgDashDot"/>
+          </a:ln>
+        </p:spPr>
+        <p:style>
+          <a:lnRef idx="1">
+            <a:schemeClr val="accent1"/>
+          </a:lnRef>
+          <a:fillRef idx="0">
+            <a:schemeClr val="accent1"/>
+          </a:fillRef>
+          <a:effectRef idx="0">
+            <a:schemeClr val="accent1"/>
+          </a:effectRef>
+          <a:fontRef idx="minor">
+            <a:schemeClr val="tx1"/>
+          </a:fontRef>
+        </p:style>
+      </p:cxnSp>
+      <p:cxnSp>
+        <p:nvCxnSpPr>
+          <p:cNvPr id="19" name="Connecteur droit avec flèche 18">
+            <a:extLst>
+              <a:ext uri="{FF2B5EF4-FFF2-40B4-BE49-F238E27FC236}">
+                <a16:creationId xmlns:a16="http://schemas.microsoft.com/office/drawing/2014/main" id="{C3A60E4D-C4CA-6982-8A84-069CC9238B91}"/>
+              </a:ext>
+            </a:extLst>
+          </p:cNvPr>
+          <p:cNvCxnSpPr>
+            <a:cxnSpLocks/>
+          </p:cNvCxnSpPr>
+          <p:nvPr/>
+        </p:nvCxnSpPr>
+        <p:spPr>
+          <a:xfrm>
+            <a:off x="2532993" y="1413641"/>
+            <a:ext cx="1497724" cy="0"/>
+          </a:xfrm>
+          <a:prstGeom prst="straightConnector1">
+            <a:avLst/>
+          </a:prstGeom>
+          <a:ln>
+            <a:headEnd type="none"/>
+            <a:tailEnd type="triangle"/>
+          </a:ln>
+        </p:spPr>
+        <p:style>
+          <a:lnRef idx="1">
+            <a:schemeClr val="accent1"/>
+          </a:lnRef>
+          <a:fillRef idx="0">
+            <a:schemeClr val="accent1"/>
+          </a:fillRef>
+          <a:effectRef idx="0">
+            <a:schemeClr val="accent1"/>
+          </a:effectRef>
+          <a:fontRef idx="minor">
+            <a:schemeClr val="tx1"/>
+          </a:fontRef>
+        </p:style>
+      </p:cxnSp>
+      <p:cxnSp>
+        <p:nvCxnSpPr>
+          <p:cNvPr id="20" name="Connecteur droit avec flèche 19">
+            <a:extLst>
+              <a:ext uri="{FF2B5EF4-FFF2-40B4-BE49-F238E27FC236}">
+                <a16:creationId xmlns:a16="http://schemas.microsoft.com/office/drawing/2014/main" id="{2CAE5C96-2AE6-D4E5-5BA5-704EA3FA2CDF}"/>
+              </a:ext>
+            </a:extLst>
+          </p:cNvPr>
+          <p:cNvCxnSpPr>
+            <a:cxnSpLocks/>
+          </p:cNvCxnSpPr>
+          <p:nvPr/>
+        </p:nvCxnSpPr>
+        <p:spPr>
+          <a:xfrm>
+            <a:off x="2429227" y="1416006"/>
+            <a:ext cx="1376713" cy="0"/>
+          </a:xfrm>
+          <a:prstGeom prst="straightConnector1">
+            <a:avLst/>
+          </a:prstGeom>
+          <a:ln>
+            <a:headEnd type="none"/>
+            <a:tailEnd type="triangle"/>
+          </a:ln>
+        </p:spPr>
+        <p:style>
+          <a:lnRef idx="1">
+            <a:schemeClr val="accent1"/>
+          </a:lnRef>
+          <a:fillRef idx="0">
+            <a:schemeClr val="accent1"/>
+          </a:fillRef>
+          <a:effectRef idx="0">
+            <a:schemeClr val="accent1"/>
+          </a:effectRef>
+          <a:fontRef idx="minor">
+            <a:schemeClr val="tx1"/>
+          </a:fontRef>
+        </p:style>
+      </p:cxnSp>
+      <p:sp>
+        <p:nvSpPr>
+          <p:cNvPr id="22" name="ZoneTexte 21">
+            <a:extLst>
+              <a:ext uri="{FF2B5EF4-FFF2-40B4-BE49-F238E27FC236}">
+                <a16:creationId xmlns:a16="http://schemas.microsoft.com/office/drawing/2014/main" id="{3F95521A-4E0D-7BD6-7AE5-5EB4EC0561E5}"/>
+              </a:ext>
+            </a:extLst>
+          </p:cNvPr>
+          <p:cNvSpPr txBox="1"/>
+          <p:nvPr/>
+        </p:nvSpPr>
+        <p:spPr>
+          <a:xfrm>
+            <a:off x="2502386" y="750077"/>
+            <a:ext cx="1219886" cy="646331"/>
+          </a:xfrm>
+          <a:prstGeom prst="rect">
+            <a:avLst/>
+          </a:prstGeom>
+          <a:noFill/>
+        </p:spPr>
+        <p:txBody>
+          <a:bodyPr wrap="none" rtlCol="0">
+            <a:spAutoFit/>
+          </a:bodyPr>
+          <a:lstStyle/>
+          <a:p>
+            <a:pPr algn="ctr"/>
+            <a:r>
+              <a:rPr lang="fr-FR" dirty="0"/>
+              <a:t>White </a:t>
+            </a:r>
+          </a:p>
+          <a:p>
+            <a:r>
+              <a:rPr lang="fr-FR" dirty="0"/>
+              <a:t>border size</a:t>
+            </a:r>
+          </a:p>
+        </p:txBody>
+      </p:sp>
+      <p:sp>
+        <p:nvSpPr>
+          <p:cNvPr id="32" name="ZoneTexte 31">
+            <a:extLst>
+              <a:ext uri="{FF2B5EF4-FFF2-40B4-BE49-F238E27FC236}">
+                <a16:creationId xmlns:a16="http://schemas.microsoft.com/office/drawing/2014/main" id="{F9A4B1A2-51C3-85A5-E7C4-4FAD88219237}"/>
+              </a:ext>
+            </a:extLst>
+          </p:cNvPr>
+          <p:cNvSpPr txBox="1"/>
+          <p:nvPr/>
+        </p:nvSpPr>
+        <p:spPr>
+          <a:xfrm>
+            <a:off x="4405373" y="762055"/>
+            <a:ext cx="1219886" cy="646331"/>
+          </a:xfrm>
+          <a:prstGeom prst="rect">
+            <a:avLst/>
+          </a:prstGeom>
+          <a:noFill/>
+        </p:spPr>
+        <p:txBody>
+          <a:bodyPr wrap="none" rtlCol="0">
+            <a:spAutoFit/>
+          </a:bodyPr>
+          <a:lstStyle/>
+          <a:p>
+            <a:pPr algn="ctr"/>
+            <a:r>
+              <a:rPr lang="fr-FR" dirty="0"/>
+              <a:t>Black </a:t>
+            </a:r>
+          </a:p>
+          <a:p>
+            <a:r>
+              <a:rPr lang="fr-FR" dirty="0"/>
+              <a:t>border size</a:t>
+            </a:r>
+          </a:p>
+        </p:txBody>
+      </p:sp>
+      <p:cxnSp>
+        <p:nvCxnSpPr>
+          <p:cNvPr id="33" name="Connecteur droit avec flèche 32">
+            <a:extLst>
+              <a:ext uri="{FF2B5EF4-FFF2-40B4-BE49-F238E27FC236}">
+                <a16:creationId xmlns:a16="http://schemas.microsoft.com/office/drawing/2014/main" id="{C87D73AB-F20D-A362-5306-4CACD5DDDEE4}"/>
+              </a:ext>
+            </a:extLst>
+          </p:cNvPr>
+          <p:cNvCxnSpPr>
+            <a:cxnSpLocks/>
+          </p:cNvCxnSpPr>
+          <p:nvPr/>
+        </p:nvCxnSpPr>
+        <p:spPr>
+          <a:xfrm>
+            <a:off x="4030717" y="1416006"/>
+            <a:ext cx="1497724" cy="0"/>
+          </a:xfrm>
+          <a:prstGeom prst="straightConnector1">
+            <a:avLst/>
+          </a:prstGeom>
+          <a:ln>
+            <a:headEnd type="triangle"/>
+            <a:tailEnd type="none"/>
+          </a:ln>
+        </p:spPr>
+        <p:style>
+          <a:lnRef idx="1">
+            <a:schemeClr val="accent1"/>
+          </a:lnRef>
+          <a:fillRef idx="0">
+            <a:schemeClr val="accent1"/>
+          </a:fillRef>
+          <a:effectRef idx="0">
+            <a:schemeClr val="accent1"/>
+          </a:effectRef>
+          <a:fontRef idx="minor">
+            <a:schemeClr val="tx1"/>
+          </a:fontRef>
+        </p:style>
+      </p:cxnSp>
+      <p:cxnSp>
+        <p:nvCxnSpPr>
+          <p:cNvPr id="34" name="Connecteur droit avec flèche 33">
+            <a:extLst>
+              <a:ext uri="{FF2B5EF4-FFF2-40B4-BE49-F238E27FC236}">
+                <a16:creationId xmlns:a16="http://schemas.microsoft.com/office/drawing/2014/main" id="{EE19CCA8-E82F-0D32-78E2-19BEDC2F94DA}"/>
+              </a:ext>
+            </a:extLst>
+          </p:cNvPr>
+          <p:cNvCxnSpPr>
+            <a:cxnSpLocks/>
+          </p:cNvCxnSpPr>
+          <p:nvPr/>
+        </p:nvCxnSpPr>
+        <p:spPr>
+          <a:xfrm>
+            <a:off x="4265162" y="1413641"/>
+            <a:ext cx="1376713" cy="0"/>
+          </a:xfrm>
+          <a:prstGeom prst="straightConnector1">
+            <a:avLst/>
+          </a:prstGeom>
+          <a:ln>
+            <a:headEnd type="triangle"/>
+            <a:tailEnd type="none"/>
+          </a:ln>
+        </p:spPr>
+        <p:style>
+          <a:lnRef idx="1">
+            <a:schemeClr val="accent1"/>
+          </a:lnRef>
+          <a:fillRef idx="0">
+            <a:schemeClr val="accent1"/>
+          </a:fillRef>
+          <a:effectRef idx="0">
+            <a:schemeClr val="accent1"/>
+          </a:effectRef>
+          <a:fontRef idx="minor">
+            <a:schemeClr val="tx1"/>
+          </a:fontRef>
+        </p:style>
+      </p:cxnSp>
+      <p:cxnSp>
+        <p:nvCxnSpPr>
+          <p:cNvPr id="35" name="Connecteur droit 34">
+            <a:extLst>
+              <a:ext uri="{FF2B5EF4-FFF2-40B4-BE49-F238E27FC236}">
+                <a16:creationId xmlns:a16="http://schemas.microsoft.com/office/drawing/2014/main" id="{AA460304-9CF2-98D9-6201-DF494AF7B329}"/>
+              </a:ext>
+            </a:extLst>
+          </p:cNvPr>
+          <p:cNvCxnSpPr>
+            <a:cxnSpLocks/>
+          </p:cNvCxnSpPr>
+          <p:nvPr/>
+        </p:nvCxnSpPr>
+        <p:spPr>
+          <a:xfrm flipH="1" flipV="1">
+            <a:off x="5864771" y="3937000"/>
+            <a:ext cx="10509" cy="971331"/>
+          </a:xfrm>
+          <a:prstGeom prst="line">
+            <a:avLst/>
+          </a:prstGeom>
+          <a:ln>
+            <a:prstDash val="lgDashDot"/>
+          </a:ln>
+        </p:spPr>
+        <p:style>
+          <a:lnRef idx="1">
+            <a:schemeClr val="accent1"/>
+          </a:lnRef>
+          <a:fillRef idx="0">
+            <a:schemeClr val="accent1"/>
+          </a:fillRef>
+          <a:effectRef idx="0">
+            <a:schemeClr val="accent1"/>
+          </a:effectRef>
+          <a:fontRef idx="minor">
+            <a:schemeClr val="tx1"/>
+          </a:fontRef>
+        </p:style>
+      </p:cxnSp>
+    </p:spTree>
+    <p:extLst>
+      <p:ext uri="{BB962C8B-B14F-4D97-AF65-F5344CB8AC3E}">
+        <p14:creationId xmlns:p14="http://schemas.microsoft.com/office/powerpoint/2010/main" val="119302946"/>
       </p:ext>
     </p:extLst>
   </p:cSld>

</xml_diff>